<commit_message>
Issue 1617: Update blog about question types and preview feature Update Issue 1617
</commit_message>
<xml_diff>
--- a/doc/mockups/Help page mockups.pptx
+++ b/doc/mockups/Help page mockups.pptx
@@ -5,7 +5,7 @@
     <p:sldMasterId id="2147483648" r:id="rId1"/>
   </p:sldMasterIdLst>
   <p:notesMasterIdLst>
-    <p:notesMasterId r:id="rId14"/>
+    <p:notesMasterId r:id="rId16"/>
   </p:notesMasterIdLst>
   <p:sldIdLst>
     <p:sldId id="256" r:id="rId2"/>
@@ -17,9 +17,11 @@
     <p:sldId id="261" r:id="rId8"/>
     <p:sldId id="264" r:id="rId9"/>
     <p:sldId id="265" r:id="rId10"/>
-    <p:sldId id="266" r:id="rId11"/>
-    <p:sldId id="268" r:id="rId12"/>
-    <p:sldId id="258" r:id="rId13"/>
+    <p:sldId id="271" r:id="rId11"/>
+    <p:sldId id="270" r:id="rId12"/>
+    <p:sldId id="266" r:id="rId13"/>
+    <p:sldId id="268" r:id="rId14"/>
+    <p:sldId id="258" r:id="rId15"/>
   </p:sldIdLst>
   <p:sldSz cx="9144000" cy="6858000" type="screen4x3"/>
   <p:notesSz cx="6858000" cy="9144000"/>
@@ -203,7 +205,7 @@
           <a:p>
             <a:fld id="{19395C29-2DAE-492C-93D8-6CD57E866DE6}" type="datetimeFigureOut">
               <a:rPr lang="en-SG" smtClean="0"/>
-              <a:t>8/1/2014</a:t>
+              <a:t>15/2/2014</a:t>
             </a:fld>
             <a:endParaRPr lang="en-SG"/>
           </a:p>
@@ -704,7 +706,91 @@
           <a:p>
             <a:fld id="{F512E9CD-BB17-427C-94A2-392131EC5789}" type="slidenum">
               <a:rPr lang="en-SG" smtClean="0"/>
-              <a:t>12</a:t>
+              <a:t>11</a:t>
+            </a:fld>
+            <a:endParaRPr lang="en-SG"/>
+          </a:p>
+        </p:txBody>
+      </p:sp>
+    </p:spTree>
+    <p:extLst>
+      <p:ext uri="{BB962C8B-B14F-4D97-AF65-F5344CB8AC3E}">
+        <p14:creationId xmlns:p14="http://schemas.microsoft.com/office/powerpoint/2010/main" val="2923782236"/>
+      </p:ext>
+    </p:extLst>
+  </p:cSld>
+  <p:clrMapOvr>
+    <a:masterClrMapping/>
+  </p:clrMapOvr>
+</p:notes>
+</file>
+
+<file path=ppt/notesSlides/notesSlide4.xml><?xml version="1.0" encoding="utf-8"?>
+<p:notes xmlns:a="http://schemas.openxmlformats.org/drawingml/2006/main" xmlns:r="http://schemas.openxmlformats.org/officeDocument/2006/relationships" xmlns:p="http://schemas.openxmlformats.org/presentationml/2006/main">
+  <p:cSld>
+    <p:spTree>
+      <p:nvGrpSpPr>
+        <p:cNvPr id="1" name=""/>
+        <p:cNvGrpSpPr/>
+        <p:nvPr/>
+      </p:nvGrpSpPr>
+      <p:grpSpPr>
+        <a:xfrm>
+          <a:off x="0" y="0"/>
+          <a:ext cx="0" cy="0"/>
+          <a:chOff x="0" y="0"/>
+          <a:chExt cx="0" cy="0"/>
+        </a:xfrm>
+      </p:grpSpPr>
+      <p:sp>
+        <p:nvSpPr>
+          <p:cNvPr id="2" name="Slide Image Placeholder 1"/>
+          <p:cNvSpPr>
+            <a:spLocks noGrp="1" noRot="1" noChangeAspect="1"/>
+          </p:cNvSpPr>
+          <p:nvPr>
+            <p:ph type="sldImg"/>
+          </p:nvPr>
+        </p:nvSpPr>
+        <p:spPr/>
+      </p:sp>
+      <p:sp>
+        <p:nvSpPr>
+          <p:cNvPr id="3" name="Notes Placeholder 2"/>
+          <p:cNvSpPr>
+            <a:spLocks noGrp="1"/>
+          </p:cNvSpPr>
+          <p:nvPr>
+            <p:ph type="body" idx="1"/>
+          </p:nvPr>
+        </p:nvSpPr>
+        <p:spPr/>
+        <p:txBody>
+          <a:bodyPr/>
+          <a:lstStyle/>
+          <a:p>
+            <a:endParaRPr lang="en-SG" dirty="0"/>
+          </a:p>
+        </p:txBody>
+      </p:sp>
+      <p:sp>
+        <p:nvSpPr>
+          <p:cNvPr id="4" name="Slide Number Placeholder 3"/>
+          <p:cNvSpPr>
+            <a:spLocks noGrp="1"/>
+          </p:cNvSpPr>
+          <p:nvPr>
+            <p:ph type="sldNum" sz="quarter" idx="10"/>
+          </p:nvPr>
+        </p:nvSpPr>
+        <p:spPr/>
+        <p:txBody>
+          <a:bodyPr/>
+          <a:lstStyle/>
+          <a:p>
+            <a:fld id="{F512E9CD-BB17-427C-94A2-392131EC5789}" type="slidenum">
+              <a:rPr lang="en-SG" smtClean="0"/>
+              <a:t>14</a:t>
             </a:fld>
             <a:endParaRPr lang="en-SG"/>
           </a:p>
@@ -905,7 +991,7 @@
             <a:fld id="{1D8BD707-D9CF-40AE-B4C6-C98DA3205C09}" type="datetimeFigureOut">
               <a:rPr lang="en-US" smtClean="0"/>
               <a:pPr/>
-              <a:t>1/8/2014</a:t>
+              <a:t>2/15/2014</a:t>
             </a:fld>
             <a:endParaRPr lang="en-US"/>
           </a:p>
@@ -1072,7 +1158,7 @@
             <a:fld id="{1D8BD707-D9CF-40AE-B4C6-C98DA3205C09}" type="datetimeFigureOut">
               <a:rPr lang="en-US" smtClean="0"/>
               <a:pPr/>
-              <a:t>1/8/2014</a:t>
+              <a:t>2/15/2014</a:t>
             </a:fld>
             <a:endParaRPr lang="en-US"/>
           </a:p>
@@ -1249,7 +1335,7 @@
             <a:fld id="{1D8BD707-D9CF-40AE-B4C6-C98DA3205C09}" type="datetimeFigureOut">
               <a:rPr lang="en-US" smtClean="0"/>
               <a:pPr/>
-              <a:t>1/8/2014</a:t>
+              <a:t>2/15/2014</a:t>
             </a:fld>
             <a:endParaRPr lang="en-US"/>
           </a:p>
@@ -1416,7 +1502,7 @@
             <a:fld id="{1D8BD707-D9CF-40AE-B4C6-C98DA3205C09}" type="datetimeFigureOut">
               <a:rPr lang="en-US" smtClean="0"/>
               <a:pPr/>
-              <a:t>1/8/2014</a:t>
+              <a:t>2/15/2014</a:t>
             </a:fld>
             <a:endParaRPr lang="en-US"/>
           </a:p>
@@ -1659,7 +1745,7 @@
             <a:fld id="{1D8BD707-D9CF-40AE-B4C6-C98DA3205C09}" type="datetimeFigureOut">
               <a:rPr lang="en-US" smtClean="0"/>
               <a:pPr/>
-              <a:t>1/8/2014</a:t>
+              <a:t>2/15/2014</a:t>
             </a:fld>
             <a:endParaRPr lang="en-US"/>
           </a:p>
@@ -1944,7 +2030,7 @@
             <a:fld id="{1D8BD707-D9CF-40AE-B4C6-C98DA3205C09}" type="datetimeFigureOut">
               <a:rPr lang="en-US" smtClean="0"/>
               <a:pPr/>
-              <a:t>1/8/2014</a:t>
+              <a:t>2/15/2014</a:t>
             </a:fld>
             <a:endParaRPr lang="en-US"/>
           </a:p>
@@ -2363,7 +2449,7 @@
             <a:fld id="{1D8BD707-D9CF-40AE-B4C6-C98DA3205C09}" type="datetimeFigureOut">
               <a:rPr lang="en-US" smtClean="0"/>
               <a:pPr/>
-              <a:t>1/8/2014</a:t>
+              <a:t>2/15/2014</a:t>
             </a:fld>
             <a:endParaRPr lang="en-US"/>
           </a:p>
@@ -2478,7 +2564,7 @@
             <a:fld id="{1D8BD707-D9CF-40AE-B4C6-C98DA3205C09}" type="datetimeFigureOut">
               <a:rPr lang="en-US" smtClean="0"/>
               <a:pPr/>
-              <a:t>1/8/2014</a:t>
+              <a:t>2/15/2014</a:t>
             </a:fld>
             <a:endParaRPr lang="en-US"/>
           </a:p>
@@ -2570,7 +2656,7 @@
             <a:fld id="{1D8BD707-D9CF-40AE-B4C6-C98DA3205C09}" type="datetimeFigureOut">
               <a:rPr lang="en-US" smtClean="0"/>
               <a:pPr/>
-              <a:t>1/8/2014</a:t>
+              <a:t>2/15/2014</a:t>
             </a:fld>
             <a:endParaRPr lang="en-US"/>
           </a:p>
@@ -2844,7 +2930,7 @@
             <a:fld id="{1D8BD707-D9CF-40AE-B4C6-C98DA3205C09}" type="datetimeFigureOut">
               <a:rPr lang="en-US" smtClean="0"/>
               <a:pPr/>
-              <a:t>1/8/2014</a:t>
+              <a:t>2/15/2014</a:t>
             </a:fld>
             <a:endParaRPr lang="en-US"/>
           </a:p>
@@ -3094,7 +3180,7 @@
             <a:fld id="{1D8BD707-D9CF-40AE-B4C6-C98DA3205C09}" type="datetimeFigureOut">
               <a:rPr lang="en-US" smtClean="0"/>
               <a:pPr/>
-              <a:t>1/8/2014</a:t>
+              <a:t>2/15/2014</a:t>
             </a:fld>
             <a:endParaRPr lang="en-US"/>
           </a:p>
@@ -3304,7 +3390,7 @@
             <a:fld id="{1D8BD707-D9CF-40AE-B4C6-C98DA3205C09}" type="datetimeFigureOut">
               <a:rPr lang="en-US" smtClean="0"/>
               <a:pPr/>
-              <a:t>1/8/2014</a:t>
+              <a:t>2/15/2014</a:t>
             </a:fld>
             <a:endParaRPr lang="en-US"/>
           </a:p>
@@ -3805,6 +3891,3761 @@
           <a:chExt cx="0" cy="0"/>
         </a:xfrm>
       </p:grpSpPr>
+      <p:grpSp>
+        <p:nvGrpSpPr>
+          <p:cNvPr id="4" name="Group 3"/>
+          <p:cNvGrpSpPr/>
+          <p:nvPr/>
+        </p:nvGrpSpPr>
+        <p:grpSpPr>
+          <a:xfrm>
+            <a:off x="1142996" y="1905000"/>
+            <a:ext cx="6934200" cy="1183012"/>
+            <a:chOff x="1142996" y="1905000"/>
+            <a:chExt cx="6934200" cy="1183012"/>
+          </a:xfrm>
+        </p:grpSpPr>
+        <p:sp>
+          <p:nvSpPr>
+            <p:cNvPr id="2" name="Rounded Rectangle 1"/>
+            <p:cNvSpPr/>
+            <p:nvPr/>
+          </p:nvSpPr>
+          <p:spPr>
+            <a:xfrm>
+              <a:off x="1142996" y="1905000"/>
+              <a:ext cx="6934200" cy="1183012"/>
+            </a:xfrm>
+            <a:prstGeom prst="roundRect">
+              <a:avLst>
+                <a:gd name="adj" fmla="val 2849"/>
+              </a:avLst>
+            </a:prstGeom>
+            <a:solidFill>
+              <a:srgbClr val="E6EDF6"/>
+            </a:solidFill>
+            <a:ln>
+              <a:noFill/>
+            </a:ln>
+          </p:spPr>
+          <p:style>
+            <a:lnRef idx="2">
+              <a:schemeClr val="accent1">
+                <a:shade val="50000"/>
+              </a:schemeClr>
+            </a:lnRef>
+            <a:fillRef idx="1">
+              <a:schemeClr val="accent1"/>
+            </a:fillRef>
+            <a:effectRef idx="0">
+              <a:schemeClr val="accent1"/>
+            </a:effectRef>
+            <a:fontRef idx="minor">
+              <a:schemeClr val="lt1"/>
+            </a:fontRef>
+          </p:style>
+          <p:txBody>
+            <a:bodyPr rtlCol="0" anchor="ctr"/>
+            <a:lstStyle/>
+            <a:p>
+              <a:pPr algn="ctr"/>
+              <a:endParaRPr lang="en-SG"/>
+            </a:p>
+          </p:txBody>
+        </p:sp>
+        <p:sp>
+          <p:nvSpPr>
+            <p:cNvPr id="3" name="TextBox 2"/>
+            <p:cNvSpPr txBox="1"/>
+            <p:nvPr/>
+          </p:nvSpPr>
+          <p:spPr>
+            <a:xfrm>
+              <a:off x="1251008" y="1977768"/>
+              <a:ext cx="5334000" cy="246221"/>
+            </a:xfrm>
+            <a:prstGeom prst="rect">
+              <a:avLst/>
+            </a:prstGeom>
+            <a:noFill/>
+          </p:spPr>
+          <p:txBody>
+            <a:bodyPr wrap="square" rtlCol="0">
+              <a:spAutoFit/>
+            </a:bodyPr>
+            <a:lstStyle>
+              <a:defPPr>
+                <a:defRPr lang="en-US"/>
+              </a:defPPr>
+              <a:lvl1pPr algn="r">
+                <a:defRPr sz="1000" b="1">
+                  <a:solidFill>
+                    <a:schemeClr val="tx1">
+                      <a:lumMod val="50000"/>
+                      <a:lumOff val="50000"/>
+                    </a:schemeClr>
+                  </a:solidFill>
+                  <a:latin typeface="Verdana" panose="020B0604030504040204" pitchFamily="34" charset="0"/>
+                  <a:ea typeface="Verdana" panose="020B0604030504040204" pitchFamily="34" charset="0"/>
+                  <a:cs typeface="Verdana" panose="020B0604030504040204" pitchFamily="34" charset="0"/>
+                </a:defRPr>
+              </a:lvl1pPr>
+            </a:lstStyle>
+            <a:p>
+              <a:pPr algn="l"/>
+              <a:r>
+                <a:rPr lang="en-US" dirty="0" smtClean="0">
+                  <a:solidFill>
+                    <a:schemeClr val="tx1">
+                      <a:lumMod val="65000"/>
+                      <a:lumOff val="35000"/>
+                    </a:schemeClr>
+                  </a:solidFill>
+                </a:rPr>
+                <a:t>Question 6:  </a:t>
+              </a:r>
+              <a:r>
+                <a:rPr lang="en-SG" dirty="0">
+                  <a:solidFill>
+                    <a:srgbClr val="0070C0"/>
+                  </a:solidFill>
+                </a:rPr>
+                <a:t>Whose presentation did you like the best</a:t>
+              </a:r>
+              <a:r>
+                <a:rPr lang="en-SG" dirty="0" smtClean="0">
+                  <a:solidFill>
+                    <a:srgbClr val="0070C0"/>
+                  </a:solidFill>
+                </a:rPr>
+                <a:t>?</a:t>
+              </a:r>
+              <a:endParaRPr lang="en-SG" dirty="0">
+                <a:solidFill>
+                  <a:srgbClr val="0070C0"/>
+                </a:solidFill>
+              </a:endParaRPr>
+            </a:p>
+          </p:txBody>
+        </p:sp>
+        <p:sp>
+          <p:nvSpPr>
+            <p:cNvPr id="8" name="TextBox 7"/>
+            <p:cNvSpPr txBox="1"/>
+            <p:nvPr/>
+          </p:nvSpPr>
+          <p:spPr>
+            <a:xfrm>
+              <a:off x="2259159" y="2274331"/>
+              <a:ext cx="1260764" cy="246221"/>
+            </a:xfrm>
+            <a:prstGeom prst="rect">
+              <a:avLst/>
+            </a:prstGeom>
+            <a:noFill/>
+          </p:spPr>
+          <p:txBody>
+            <a:bodyPr wrap="square" rtlCol="0">
+              <a:spAutoFit/>
+            </a:bodyPr>
+            <a:lstStyle>
+              <a:defPPr>
+                <a:defRPr lang="en-US"/>
+              </a:defPPr>
+              <a:lvl1pPr algn="r">
+                <a:defRPr sz="1000" b="1">
+                  <a:solidFill>
+                    <a:schemeClr val="tx1">
+                      <a:lumMod val="50000"/>
+                      <a:lumOff val="50000"/>
+                    </a:schemeClr>
+                  </a:solidFill>
+                  <a:latin typeface="Verdana" panose="020B0604030504040204" pitchFamily="34" charset="0"/>
+                  <a:ea typeface="Verdana" panose="020B0604030504040204" pitchFamily="34" charset="0"/>
+                  <a:cs typeface="Verdana" panose="020B0604030504040204" pitchFamily="34" charset="0"/>
+                </a:defRPr>
+              </a:lvl1pPr>
+            </a:lstStyle>
+            <a:p>
+              <a:pPr algn="l"/>
+              <a:r>
+                <a:rPr lang="en-US" b="0" dirty="0" smtClean="0">
+                  <a:solidFill>
+                    <a:schemeClr val="tx1">
+                      <a:lumMod val="65000"/>
+                      <a:lumOff val="35000"/>
+                    </a:schemeClr>
+                  </a:solidFill>
+                </a:rPr>
+                <a:t>Alice Betsy</a:t>
+              </a:r>
+              <a:endParaRPr lang="en-SG" dirty="0"/>
+            </a:p>
+          </p:txBody>
+        </p:sp>
+        <p:pic>
+          <p:nvPicPr>
+            <p:cNvPr id="13" name="Picture 2"/>
+            <p:cNvPicPr>
+              <a:picLocks noChangeAspect="1" noChangeArrowheads="1"/>
+            </p:cNvPicPr>
+            <p:nvPr/>
+          </p:nvPicPr>
+          <p:blipFill>
+            <a:blip r:embed="rId2">
+              <a:extLst>
+                <a:ext uri="{28A0092B-C50C-407E-A947-70E740481C1C}">
+                  <a14:useLocalDpi xmlns:a14="http://schemas.microsoft.com/office/drawing/2010/main" val="0"/>
+                </a:ext>
+              </a:extLst>
+            </a:blip>
+            <a:srcRect/>
+            <a:stretch>
+              <a:fillRect/>
+            </a:stretch>
+          </p:blipFill>
+          <p:spPr bwMode="auto">
+            <a:xfrm>
+              <a:off x="2135334" y="2340291"/>
+              <a:ext cx="123825" cy="114300"/>
+            </a:xfrm>
+            <a:prstGeom prst="flowChartConnector">
+              <a:avLst/>
+            </a:prstGeom>
+            <a:noFill/>
+            <a:ln>
+              <a:noFill/>
+            </a:ln>
+            <a:extLst>
+              <a:ext uri="{909E8E84-426E-40DD-AFC4-6F175D3DCCD1}">
+                <a14:hiddenFill xmlns:a14="http://schemas.microsoft.com/office/drawing/2010/main">
+                  <a:solidFill>
+                    <a:schemeClr val="accent1"/>
+                  </a:solidFill>
+                </a14:hiddenFill>
+              </a:ext>
+              <a:ext uri="{91240B29-F687-4F45-9708-019B960494DF}">
+                <a14:hiddenLine xmlns:a14="http://schemas.microsoft.com/office/drawing/2010/main" w="9525">
+                  <a:solidFill>
+                    <a:schemeClr val="tx1"/>
+                  </a:solidFill>
+                  <a:miter lim="800000"/>
+                  <a:headEnd/>
+                  <a:tailEnd/>
+                </a14:hiddenLine>
+              </a:ext>
+            </a:extLst>
+          </p:spPr>
+        </p:pic>
+        <p:sp>
+          <p:nvSpPr>
+            <p:cNvPr id="14" name="TextBox 13"/>
+            <p:cNvSpPr txBox="1"/>
+            <p:nvPr/>
+          </p:nvSpPr>
+          <p:spPr>
+            <a:xfrm>
+              <a:off x="2258292" y="2485310"/>
+              <a:ext cx="1260764" cy="246221"/>
+            </a:xfrm>
+            <a:prstGeom prst="rect">
+              <a:avLst/>
+            </a:prstGeom>
+            <a:noFill/>
+          </p:spPr>
+          <p:txBody>
+            <a:bodyPr wrap="square" rtlCol="0">
+              <a:spAutoFit/>
+            </a:bodyPr>
+            <a:lstStyle>
+              <a:defPPr>
+                <a:defRPr lang="en-US"/>
+              </a:defPPr>
+              <a:lvl1pPr algn="r">
+                <a:defRPr sz="1000" b="1">
+                  <a:solidFill>
+                    <a:schemeClr val="tx1">
+                      <a:lumMod val="50000"/>
+                      <a:lumOff val="50000"/>
+                    </a:schemeClr>
+                  </a:solidFill>
+                  <a:latin typeface="Verdana" panose="020B0604030504040204" pitchFamily="34" charset="0"/>
+                  <a:ea typeface="Verdana" panose="020B0604030504040204" pitchFamily="34" charset="0"/>
+                  <a:cs typeface="Verdana" panose="020B0604030504040204" pitchFamily="34" charset="0"/>
+                </a:defRPr>
+              </a:lvl1pPr>
+            </a:lstStyle>
+            <a:p>
+              <a:pPr algn="l"/>
+              <a:r>
+                <a:rPr lang="en-US" b="0" dirty="0" smtClean="0">
+                  <a:solidFill>
+                    <a:schemeClr val="tx1">
+                      <a:lumMod val="65000"/>
+                      <a:lumOff val="35000"/>
+                    </a:schemeClr>
+                  </a:solidFill>
+                </a:rPr>
+                <a:t>Benny Carmen</a:t>
+              </a:r>
+              <a:endParaRPr lang="en-SG" dirty="0"/>
+            </a:p>
+          </p:txBody>
+        </p:sp>
+        <p:pic>
+          <p:nvPicPr>
+            <p:cNvPr id="15" name="Picture 2"/>
+            <p:cNvPicPr>
+              <a:picLocks noChangeAspect="1" noChangeArrowheads="1"/>
+            </p:cNvPicPr>
+            <p:nvPr/>
+          </p:nvPicPr>
+          <p:blipFill>
+            <a:blip r:embed="rId2">
+              <a:extLst>
+                <a:ext uri="{28A0092B-C50C-407E-A947-70E740481C1C}">
+                  <a14:useLocalDpi xmlns:a14="http://schemas.microsoft.com/office/drawing/2010/main" val="0"/>
+                </a:ext>
+              </a:extLst>
+            </a:blip>
+            <a:srcRect/>
+            <a:stretch>
+              <a:fillRect/>
+            </a:stretch>
+          </p:blipFill>
+          <p:spPr bwMode="auto">
+            <a:xfrm>
+              <a:off x="2134467" y="2551270"/>
+              <a:ext cx="123825" cy="114300"/>
+            </a:xfrm>
+            <a:prstGeom prst="flowChartConnector">
+              <a:avLst/>
+            </a:prstGeom>
+            <a:noFill/>
+            <a:ln>
+              <a:noFill/>
+            </a:ln>
+            <a:extLst>
+              <a:ext uri="{909E8E84-426E-40DD-AFC4-6F175D3DCCD1}">
+                <a14:hiddenFill xmlns:a14="http://schemas.microsoft.com/office/drawing/2010/main">
+                  <a:solidFill>
+                    <a:schemeClr val="accent1"/>
+                  </a:solidFill>
+                </a14:hiddenFill>
+              </a:ext>
+              <a:ext uri="{91240B29-F687-4F45-9708-019B960494DF}">
+                <a14:hiddenLine xmlns:a14="http://schemas.microsoft.com/office/drawing/2010/main" w="9525">
+                  <a:solidFill>
+                    <a:schemeClr val="tx1"/>
+                  </a:solidFill>
+                  <a:miter lim="800000"/>
+                  <a:headEnd/>
+                  <a:tailEnd/>
+                </a14:hiddenLine>
+              </a:ext>
+            </a:extLst>
+          </p:spPr>
+        </p:pic>
+        <p:sp>
+          <p:nvSpPr>
+            <p:cNvPr id="16" name="TextBox 15"/>
+            <p:cNvSpPr txBox="1"/>
+            <p:nvPr/>
+          </p:nvSpPr>
+          <p:spPr>
+            <a:xfrm>
+              <a:off x="2260026" y="2696773"/>
+              <a:ext cx="1260764" cy="246221"/>
+            </a:xfrm>
+            <a:prstGeom prst="rect">
+              <a:avLst/>
+            </a:prstGeom>
+            <a:noFill/>
+          </p:spPr>
+          <p:txBody>
+            <a:bodyPr wrap="square" rtlCol="0">
+              <a:spAutoFit/>
+            </a:bodyPr>
+            <a:lstStyle>
+              <a:defPPr>
+                <a:defRPr lang="en-US"/>
+              </a:defPPr>
+              <a:lvl1pPr algn="r">
+                <a:defRPr sz="1000" b="1">
+                  <a:solidFill>
+                    <a:schemeClr val="tx1">
+                      <a:lumMod val="50000"/>
+                      <a:lumOff val="50000"/>
+                    </a:schemeClr>
+                  </a:solidFill>
+                  <a:latin typeface="Verdana" panose="020B0604030504040204" pitchFamily="34" charset="0"/>
+                  <a:ea typeface="Verdana" panose="020B0604030504040204" pitchFamily="34" charset="0"/>
+                  <a:cs typeface="Verdana" panose="020B0604030504040204" pitchFamily="34" charset="0"/>
+                </a:defRPr>
+              </a:lvl1pPr>
+            </a:lstStyle>
+            <a:p>
+              <a:pPr algn="l"/>
+              <a:r>
+                <a:rPr lang="en-US" b="0" dirty="0" smtClean="0">
+                  <a:solidFill>
+                    <a:schemeClr val="tx1">
+                      <a:lumMod val="65000"/>
+                      <a:lumOff val="35000"/>
+                    </a:schemeClr>
+                  </a:solidFill>
+                </a:rPr>
+                <a:t>Charlie Davis</a:t>
+              </a:r>
+              <a:endParaRPr lang="en-SG" dirty="0"/>
+            </a:p>
+          </p:txBody>
+        </p:sp>
+        <p:pic>
+          <p:nvPicPr>
+            <p:cNvPr id="17" name="Picture 2"/>
+            <p:cNvPicPr>
+              <a:picLocks noChangeAspect="1" noChangeArrowheads="1"/>
+            </p:cNvPicPr>
+            <p:nvPr/>
+          </p:nvPicPr>
+          <p:blipFill>
+            <a:blip r:embed="rId2">
+              <a:extLst>
+                <a:ext uri="{28A0092B-C50C-407E-A947-70E740481C1C}">
+                  <a14:useLocalDpi xmlns:a14="http://schemas.microsoft.com/office/drawing/2010/main" val="0"/>
+                </a:ext>
+              </a:extLst>
+            </a:blip>
+            <a:srcRect/>
+            <a:stretch>
+              <a:fillRect/>
+            </a:stretch>
+          </p:blipFill>
+          <p:spPr bwMode="auto">
+            <a:xfrm>
+              <a:off x="2136201" y="2762733"/>
+              <a:ext cx="123825" cy="114300"/>
+            </a:xfrm>
+            <a:prstGeom prst="flowChartConnector">
+              <a:avLst/>
+            </a:prstGeom>
+            <a:noFill/>
+            <a:ln>
+              <a:noFill/>
+            </a:ln>
+            <a:extLst>
+              <a:ext uri="{909E8E84-426E-40DD-AFC4-6F175D3DCCD1}">
+                <a14:hiddenFill xmlns:a14="http://schemas.microsoft.com/office/drawing/2010/main">
+                  <a:solidFill>
+                    <a:schemeClr val="accent1"/>
+                  </a:solidFill>
+                </a14:hiddenFill>
+              </a:ext>
+              <a:ext uri="{91240B29-F687-4F45-9708-019B960494DF}">
+                <a14:hiddenLine xmlns:a14="http://schemas.microsoft.com/office/drawing/2010/main" w="9525">
+                  <a:solidFill>
+                    <a:schemeClr val="tx1"/>
+                  </a:solidFill>
+                  <a:miter lim="800000"/>
+                  <a:headEnd/>
+                  <a:tailEnd/>
+                </a14:hiddenLine>
+              </a:ext>
+            </a:extLst>
+          </p:spPr>
+        </p:pic>
+        <p:sp>
+          <p:nvSpPr>
+            <p:cNvPr id="18" name="TextBox 17"/>
+            <p:cNvSpPr txBox="1"/>
+            <p:nvPr/>
+          </p:nvSpPr>
+          <p:spPr>
+            <a:xfrm>
+              <a:off x="3810867" y="2287213"/>
+              <a:ext cx="1260764" cy="246221"/>
+            </a:xfrm>
+            <a:prstGeom prst="rect">
+              <a:avLst/>
+            </a:prstGeom>
+            <a:noFill/>
+          </p:spPr>
+          <p:txBody>
+            <a:bodyPr wrap="square" rtlCol="0">
+              <a:spAutoFit/>
+            </a:bodyPr>
+            <a:lstStyle>
+              <a:defPPr>
+                <a:defRPr lang="en-US"/>
+              </a:defPPr>
+              <a:lvl1pPr algn="r">
+                <a:defRPr sz="1000" b="1">
+                  <a:solidFill>
+                    <a:schemeClr val="tx1">
+                      <a:lumMod val="50000"/>
+                      <a:lumOff val="50000"/>
+                    </a:schemeClr>
+                  </a:solidFill>
+                  <a:latin typeface="Verdana" panose="020B0604030504040204" pitchFamily="34" charset="0"/>
+                  <a:ea typeface="Verdana" panose="020B0604030504040204" pitchFamily="34" charset="0"/>
+                  <a:cs typeface="Verdana" panose="020B0604030504040204" pitchFamily="34" charset="0"/>
+                </a:defRPr>
+              </a:lvl1pPr>
+            </a:lstStyle>
+            <a:p>
+              <a:pPr algn="l"/>
+              <a:r>
+                <a:rPr lang="en-US" b="0" dirty="0" smtClean="0">
+                  <a:solidFill>
+                    <a:schemeClr val="tx1">
+                      <a:lumMod val="65000"/>
+                      <a:lumOff val="35000"/>
+                    </a:schemeClr>
+                  </a:solidFill>
+                </a:rPr>
+                <a:t>Danny Engels</a:t>
+              </a:r>
+              <a:endParaRPr lang="en-SG" dirty="0"/>
+            </a:p>
+          </p:txBody>
+        </p:sp>
+        <p:pic>
+          <p:nvPicPr>
+            <p:cNvPr id="19" name="Picture 2"/>
+            <p:cNvPicPr>
+              <a:picLocks noChangeAspect="1" noChangeArrowheads="1"/>
+            </p:cNvPicPr>
+            <p:nvPr/>
+          </p:nvPicPr>
+          <p:blipFill>
+            <a:blip r:embed="rId2">
+              <a:extLst>
+                <a:ext uri="{28A0092B-C50C-407E-A947-70E740481C1C}">
+                  <a14:useLocalDpi xmlns:a14="http://schemas.microsoft.com/office/drawing/2010/main" val="0"/>
+                </a:ext>
+              </a:extLst>
+            </a:blip>
+            <a:srcRect/>
+            <a:stretch>
+              <a:fillRect/>
+            </a:stretch>
+          </p:blipFill>
+          <p:spPr bwMode="auto">
+            <a:xfrm>
+              <a:off x="3687042" y="2353173"/>
+              <a:ext cx="123825" cy="114300"/>
+            </a:xfrm>
+            <a:prstGeom prst="flowChartConnector">
+              <a:avLst/>
+            </a:prstGeom>
+            <a:noFill/>
+            <a:ln>
+              <a:noFill/>
+            </a:ln>
+            <a:extLst>
+              <a:ext uri="{909E8E84-426E-40DD-AFC4-6F175D3DCCD1}">
+                <a14:hiddenFill xmlns:a14="http://schemas.microsoft.com/office/drawing/2010/main">
+                  <a:solidFill>
+                    <a:schemeClr val="accent1"/>
+                  </a:solidFill>
+                </a14:hiddenFill>
+              </a:ext>
+              <a:ext uri="{91240B29-F687-4F45-9708-019B960494DF}">
+                <a14:hiddenLine xmlns:a14="http://schemas.microsoft.com/office/drawing/2010/main" w="9525">
+                  <a:solidFill>
+                    <a:schemeClr val="tx1"/>
+                  </a:solidFill>
+                  <a:miter lim="800000"/>
+                  <a:headEnd/>
+                  <a:tailEnd/>
+                </a14:hiddenLine>
+              </a:ext>
+            </a:extLst>
+          </p:spPr>
+        </p:pic>
+        <p:sp>
+          <p:nvSpPr>
+            <p:cNvPr id="20" name="TextBox 19"/>
+            <p:cNvSpPr txBox="1"/>
+            <p:nvPr/>
+          </p:nvSpPr>
+          <p:spPr>
+            <a:xfrm>
+              <a:off x="3810867" y="2477619"/>
+              <a:ext cx="1260764" cy="246221"/>
+            </a:xfrm>
+            <a:prstGeom prst="rect">
+              <a:avLst/>
+            </a:prstGeom>
+            <a:noFill/>
+          </p:spPr>
+          <p:txBody>
+            <a:bodyPr wrap="square" rtlCol="0">
+              <a:spAutoFit/>
+            </a:bodyPr>
+            <a:lstStyle>
+              <a:defPPr>
+                <a:defRPr lang="en-US"/>
+              </a:defPPr>
+              <a:lvl1pPr algn="r">
+                <a:defRPr sz="1000" b="1">
+                  <a:solidFill>
+                    <a:schemeClr val="tx1">
+                      <a:lumMod val="50000"/>
+                      <a:lumOff val="50000"/>
+                    </a:schemeClr>
+                  </a:solidFill>
+                  <a:latin typeface="Verdana" panose="020B0604030504040204" pitchFamily="34" charset="0"/>
+                  <a:ea typeface="Verdana" panose="020B0604030504040204" pitchFamily="34" charset="0"/>
+                  <a:cs typeface="Verdana" panose="020B0604030504040204" pitchFamily="34" charset="0"/>
+                </a:defRPr>
+              </a:lvl1pPr>
+            </a:lstStyle>
+            <a:p>
+              <a:pPr algn="l"/>
+              <a:r>
+                <a:rPr lang="en-US" b="0" dirty="0" smtClean="0">
+                  <a:solidFill>
+                    <a:schemeClr val="tx1">
+                      <a:lumMod val="65000"/>
+                      <a:lumOff val="35000"/>
+                    </a:schemeClr>
+                  </a:solidFill>
+                </a:rPr>
+                <a:t>Emily Fowler</a:t>
+              </a:r>
+              <a:endParaRPr lang="en-SG" dirty="0"/>
+            </a:p>
+          </p:txBody>
+        </p:sp>
+        <p:pic>
+          <p:nvPicPr>
+            <p:cNvPr id="21" name="Picture 2"/>
+            <p:cNvPicPr>
+              <a:picLocks noChangeAspect="1" noChangeArrowheads="1"/>
+            </p:cNvPicPr>
+            <p:nvPr/>
+          </p:nvPicPr>
+          <p:blipFill>
+            <a:blip r:embed="rId2">
+              <a:extLst>
+                <a:ext uri="{28A0092B-C50C-407E-A947-70E740481C1C}">
+                  <a14:useLocalDpi xmlns:a14="http://schemas.microsoft.com/office/drawing/2010/main" val="0"/>
+                </a:ext>
+              </a:extLst>
+            </a:blip>
+            <a:srcRect/>
+            <a:stretch>
+              <a:fillRect/>
+            </a:stretch>
+          </p:blipFill>
+          <p:spPr bwMode="auto">
+            <a:xfrm>
+              <a:off x="3687042" y="2543579"/>
+              <a:ext cx="123825" cy="114300"/>
+            </a:xfrm>
+            <a:prstGeom prst="flowChartConnector">
+              <a:avLst/>
+            </a:prstGeom>
+            <a:noFill/>
+            <a:ln>
+              <a:noFill/>
+            </a:ln>
+            <a:extLst>
+              <a:ext uri="{909E8E84-426E-40DD-AFC4-6F175D3DCCD1}">
+                <a14:hiddenFill xmlns:a14="http://schemas.microsoft.com/office/drawing/2010/main">
+                  <a:solidFill>
+                    <a:schemeClr val="accent1"/>
+                  </a:solidFill>
+                </a14:hiddenFill>
+              </a:ext>
+              <a:ext uri="{91240B29-F687-4F45-9708-019B960494DF}">
+                <a14:hiddenLine xmlns:a14="http://schemas.microsoft.com/office/drawing/2010/main" w="9525">
+                  <a:solidFill>
+                    <a:schemeClr val="tx1"/>
+                  </a:solidFill>
+                  <a:miter lim="800000"/>
+                  <a:headEnd/>
+                  <a:tailEnd/>
+                </a14:hiddenLine>
+              </a:ext>
+            </a:extLst>
+          </p:spPr>
+        </p:pic>
+        <p:sp>
+          <p:nvSpPr>
+            <p:cNvPr id="22" name="TextBox 21"/>
+            <p:cNvSpPr txBox="1"/>
+            <p:nvPr/>
+          </p:nvSpPr>
+          <p:spPr>
+            <a:xfrm>
+              <a:off x="3810000" y="2688598"/>
+              <a:ext cx="1260764" cy="246221"/>
+            </a:xfrm>
+            <a:prstGeom prst="rect">
+              <a:avLst/>
+            </a:prstGeom>
+            <a:noFill/>
+          </p:spPr>
+          <p:txBody>
+            <a:bodyPr wrap="square" rtlCol="0">
+              <a:spAutoFit/>
+            </a:bodyPr>
+            <a:lstStyle>
+              <a:defPPr>
+                <a:defRPr lang="en-US"/>
+              </a:defPPr>
+              <a:lvl1pPr algn="r">
+                <a:defRPr sz="1000" b="1">
+                  <a:solidFill>
+                    <a:schemeClr val="tx1">
+                      <a:lumMod val="50000"/>
+                      <a:lumOff val="50000"/>
+                    </a:schemeClr>
+                  </a:solidFill>
+                  <a:latin typeface="Verdana" panose="020B0604030504040204" pitchFamily="34" charset="0"/>
+                  <a:ea typeface="Verdana" panose="020B0604030504040204" pitchFamily="34" charset="0"/>
+                  <a:cs typeface="Verdana" panose="020B0604030504040204" pitchFamily="34" charset="0"/>
+                </a:defRPr>
+              </a:lvl1pPr>
+            </a:lstStyle>
+            <a:p>
+              <a:pPr algn="l"/>
+              <a:r>
+                <a:rPr lang="en-US" b="0" dirty="0" smtClean="0">
+                  <a:solidFill>
+                    <a:schemeClr val="tx1">
+                      <a:lumMod val="65000"/>
+                      <a:lumOff val="35000"/>
+                    </a:schemeClr>
+                  </a:solidFill>
+                </a:rPr>
+                <a:t>Frank Gore</a:t>
+              </a:r>
+              <a:endParaRPr lang="en-SG" dirty="0"/>
+            </a:p>
+          </p:txBody>
+        </p:sp>
+        <p:pic>
+          <p:nvPicPr>
+            <p:cNvPr id="23" name="Picture 2"/>
+            <p:cNvPicPr>
+              <a:picLocks noChangeAspect="1" noChangeArrowheads="1"/>
+            </p:cNvPicPr>
+            <p:nvPr/>
+          </p:nvPicPr>
+          <p:blipFill>
+            <a:blip r:embed="rId2">
+              <a:extLst>
+                <a:ext uri="{28A0092B-C50C-407E-A947-70E740481C1C}">
+                  <a14:useLocalDpi xmlns:a14="http://schemas.microsoft.com/office/drawing/2010/main" val="0"/>
+                </a:ext>
+              </a:extLst>
+            </a:blip>
+            <a:srcRect/>
+            <a:stretch>
+              <a:fillRect/>
+            </a:stretch>
+          </p:blipFill>
+          <p:spPr bwMode="auto">
+            <a:xfrm>
+              <a:off x="3686175" y="2754558"/>
+              <a:ext cx="123825" cy="114300"/>
+            </a:xfrm>
+            <a:prstGeom prst="flowChartConnector">
+              <a:avLst/>
+            </a:prstGeom>
+            <a:noFill/>
+            <a:ln>
+              <a:noFill/>
+            </a:ln>
+            <a:extLst>
+              <a:ext uri="{909E8E84-426E-40DD-AFC4-6F175D3DCCD1}">
+                <a14:hiddenFill xmlns:a14="http://schemas.microsoft.com/office/drawing/2010/main">
+                  <a:solidFill>
+                    <a:schemeClr val="accent1"/>
+                  </a:solidFill>
+                </a14:hiddenFill>
+              </a:ext>
+              <a:ext uri="{91240B29-F687-4F45-9708-019B960494DF}">
+                <a14:hiddenLine xmlns:a14="http://schemas.microsoft.com/office/drawing/2010/main" w="9525">
+                  <a:solidFill>
+                    <a:schemeClr val="tx1"/>
+                  </a:solidFill>
+                  <a:miter lim="800000"/>
+                  <a:headEnd/>
+                  <a:tailEnd/>
+                </a14:hiddenLine>
+              </a:ext>
+            </a:extLst>
+          </p:spPr>
+        </p:pic>
+      </p:grpSp>
+      <p:grpSp>
+        <p:nvGrpSpPr>
+          <p:cNvPr id="45" name="Group 44"/>
+          <p:cNvGrpSpPr/>
+          <p:nvPr/>
+        </p:nvGrpSpPr>
+        <p:grpSpPr>
+          <a:xfrm>
+            <a:off x="1143000" y="4267200"/>
+            <a:ext cx="6934200" cy="838200"/>
+            <a:chOff x="1251008" y="4267200"/>
+            <a:chExt cx="6934200" cy="838200"/>
+          </a:xfrm>
+        </p:grpSpPr>
+        <p:sp>
+          <p:nvSpPr>
+            <p:cNvPr id="25" name="Rounded Rectangle 24"/>
+            <p:cNvSpPr/>
+            <p:nvPr/>
+          </p:nvSpPr>
+          <p:spPr>
+            <a:xfrm>
+              <a:off x="1251008" y="4267200"/>
+              <a:ext cx="6934200" cy="838200"/>
+            </a:xfrm>
+            <a:prstGeom prst="roundRect">
+              <a:avLst>
+                <a:gd name="adj" fmla="val 2849"/>
+              </a:avLst>
+            </a:prstGeom>
+            <a:solidFill>
+              <a:srgbClr val="E6EDF6"/>
+            </a:solidFill>
+            <a:ln>
+              <a:noFill/>
+            </a:ln>
+          </p:spPr>
+          <p:style>
+            <a:lnRef idx="2">
+              <a:schemeClr val="accent1">
+                <a:shade val="50000"/>
+              </a:schemeClr>
+            </a:lnRef>
+            <a:fillRef idx="1">
+              <a:schemeClr val="accent1"/>
+            </a:fillRef>
+            <a:effectRef idx="0">
+              <a:schemeClr val="accent1"/>
+            </a:effectRef>
+            <a:fontRef idx="minor">
+              <a:schemeClr val="lt1"/>
+            </a:fontRef>
+          </p:style>
+          <p:txBody>
+            <a:bodyPr rtlCol="0" anchor="ctr"/>
+            <a:lstStyle/>
+            <a:p>
+              <a:pPr algn="ctr"/>
+              <a:endParaRPr lang="en-SG"/>
+            </a:p>
+          </p:txBody>
+        </p:sp>
+        <p:sp>
+          <p:nvSpPr>
+            <p:cNvPr id="26" name="TextBox 25"/>
+            <p:cNvSpPr txBox="1"/>
+            <p:nvPr/>
+          </p:nvSpPr>
+          <p:spPr>
+            <a:xfrm>
+              <a:off x="1359020" y="4339968"/>
+              <a:ext cx="1637666" cy="246221"/>
+            </a:xfrm>
+            <a:prstGeom prst="rect">
+              <a:avLst/>
+            </a:prstGeom>
+            <a:noFill/>
+          </p:spPr>
+          <p:txBody>
+            <a:bodyPr wrap="square" rtlCol="0">
+              <a:spAutoFit/>
+            </a:bodyPr>
+            <a:lstStyle>
+              <a:defPPr>
+                <a:defRPr lang="en-US"/>
+              </a:defPPr>
+              <a:lvl1pPr algn="r">
+                <a:defRPr sz="1000" b="1">
+                  <a:solidFill>
+                    <a:schemeClr val="tx1">
+                      <a:lumMod val="50000"/>
+                      <a:lumOff val="50000"/>
+                    </a:schemeClr>
+                  </a:solidFill>
+                  <a:latin typeface="Verdana" panose="020B0604030504040204" pitchFamily="34" charset="0"/>
+                  <a:ea typeface="Verdana" panose="020B0604030504040204" pitchFamily="34" charset="0"/>
+                  <a:cs typeface="Verdana" panose="020B0604030504040204" pitchFamily="34" charset="0"/>
+                </a:defRPr>
+              </a:lvl1pPr>
+            </a:lstStyle>
+            <a:p>
+              <a:pPr algn="l"/>
+              <a:r>
+                <a:rPr lang="en-US" dirty="0" smtClean="0">
+                  <a:solidFill>
+                    <a:schemeClr val="tx1">
+                      <a:lumMod val="65000"/>
+                      <a:lumOff val="35000"/>
+                    </a:schemeClr>
+                  </a:solidFill>
+                </a:rPr>
+                <a:t>Preview session as:</a:t>
+              </a:r>
+              <a:endParaRPr lang="en-SG" dirty="0">
+                <a:solidFill>
+                  <a:srgbClr val="0070C0"/>
+                </a:solidFill>
+              </a:endParaRPr>
+            </a:p>
+          </p:txBody>
+        </p:sp>
+        <p:sp>
+          <p:nvSpPr>
+            <p:cNvPr id="39" name="Rounded Rectangle 38"/>
+            <p:cNvSpPr/>
+            <p:nvPr/>
+          </p:nvSpPr>
+          <p:spPr>
+            <a:xfrm>
+              <a:off x="6376994" y="4362335"/>
+              <a:ext cx="1700202" cy="242837"/>
+            </a:xfrm>
+            <a:prstGeom prst="roundRect">
+              <a:avLst>
+                <a:gd name="adj" fmla="val 50000"/>
+              </a:avLst>
+            </a:prstGeom>
+            <a:solidFill>
+              <a:srgbClr val="0070C0"/>
+            </a:solidFill>
+            <a:ln>
+              <a:noFill/>
+            </a:ln>
+          </p:spPr>
+          <p:style>
+            <a:lnRef idx="2">
+              <a:schemeClr val="accent1">
+                <a:shade val="50000"/>
+              </a:schemeClr>
+            </a:lnRef>
+            <a:fillRef idx="1">
+              <a:schemeClr val="accent1"/>
+            </a:fillRef>
+            <a:effectRef idx="0">
+              <a:schemeClr val="accent1"/>
+            </a:effectRef>
+            <a:fontRef idx="minor">
+              <a:schemeClr val="lt1"/>
+            </a:fontRef>
+          </p:style>
+          <p:txBody>
+            <a:bodyPr rtlCol="0" anchor="ctr"/>
+            <a:lstStyle/>
+            <a:p>
+              <a:pPr algn="ctr"/>
+              <a:r>
+                <a:rPr lang="en-US" sz="1200" dirty="0" smtClean="0"/>
+                <a:t>Preview as Student</a:t>
+              </a:r>
+              <a:endParaRPr lang="en-SG" sz="1200" dirty="0"/>
+            </a:p>
+          </p:txBody>
+        </p:sp>
+        <p:pic>
+          <p:nvPicPr>
+            <p:cNvPr id="40" name="Picture 39"/>
+            <p:cNvPicPr>
+              <a:picLocks noChangeAspect="1" noChangeArrowheads="1"/>
+            </p:cNvPicPr>
+            <p:nvPr/>
+          </p:nvPicPr>
+          <p:blipFill rotWithShape="1">
+            <a:blip r:embed="rId3">
+              <a:extLst>
+                <a:ext uri="{28A0092B-C50C-407E-A947-70E740481C1C}">
+                  <a14:useLocalDpi xmlns:a14="http://schemas.microsoft.com/office/drawing/2010/main" val="0"/>
+                </a:ext>
+              </a:extLst>
+            </a:blip>
+            <a:srcRect l="88315"/>
+            <a:stretch/>
+          </p:blipFill>
+          <p:spPr bwMode="auto">
+            <a:xfrm>
+              <a:off x="6044605" y="4351159"/>
+              <a:ext cx="200657" cy="230505"/>
+            </a:xfrm>
+            <a:prstGeom prst="rect">
+              <a:avLst/>
+            </a:prstGeom>
+            <a:noFill/>
+            <a:ln>
+              <a:noFill/>
+            </a:ln>
+            <a:extLst>
+              <a:ext uri="{909E8E84-426E-40DD-AFC4-6F175D3DCCD1}">
+                <a14:hiddenFill xmlns:a14="http://schemas.microsoft.com/office/drawing/2010/main">
+                  <a:solidFill>
+                    <a:schemeClr val="accent1"/>
+                  </a:solidFill>
+                </a14:hiddenFill>
+              </a:ext>
+              <a:ext uri="{91240B29-F687-4F45-9708-019B960494DF}">
+                <a14:hiddenLine xmlns:a14="http://schemas.microsoft.com/office/drawing/2010/main" w="9525">
+                  <a:solidFill>
+                    <a:schemeClr val="tx1"/>
+                  </a:solidFill>
+                  <a:miter lim="800000"/>
+                  <a:headEnd/>
+                  <a:tailEnd/>
+                </a14:hiddenLine>
+              </a:ext>
+            </a:extLst>
+          </p:spPr>
+        </p:pic>
+        <p:sp>
+          <p:nvSpPr>
+            <p:cNvPr id="41" name="Rectangle 40"/>
+            <p:cNvSpPr/>
+            <p:nvPr/>
+          </p:nvSpPr>
+          <p:spPr>
+            <a:xfrm>
+              <a:off x="2996686" y="4362335"/>
+              <a:ext cx="3065331" cy="201486"/>
+            </a:xfrm>
+            <a:prstGeom prst="rect">
+              <a:avLst/>
+            </a:prstGeom>
+            <a:solidFill>
+              <a:schemeClr val="bg1"/>
+            </a:solidFill>
+            <a:ln w="9525">
+              <a:solidFill>
+                <a:schemeClr val="bg1">
+                  <a:lumMod val="75000"/>
+                </a:schemeClr>
+              </a:solidFill>
+            </a:ln>
+          </p:spPr>
+          <p:style>
+            <a:lnRef idx="2">
+              <a:schemeClr val="accent1">
+                <a:shade val="50000"/>
+              </a:schemeClr>
+            </a:lnRef>
+            <a:fillRef idx="1">
+              <a:schemeClr val="accent1"/>
+            </a:fillRef>
+            <a:effectRef idx="0">
+              <a:schemeClr val="accent1"/>
+            </a:effectRef>
+            <a:fontRef idx="minor">
+              <a:schemeClr val="lt1"/>
+            </a:fontRef>
+          </p:style>
+          <p:txBody>
+            <a:bodyPr lIns="0" tIns="0" rIns="0" bIns="0" rtlCol="0" anchor="ctr"/>
+            <a:lstStyle/>
+            <a:p>
+              <a:r>
+                <a:rPr lang="en-US" sz="1200" dirty="0" smtClean="0">
+                  <a:solidFill>
+                    <a:srgbClr val="0070C0"/>
+                  </a:solidFill>
+                </a:rPr>
+                <a:t> [team 2]   Emily Fowler</a:t>
+              </a:r>
+              <a:endParaRPr lang="en-SG" sz="1200" dirty="0">
+                <a:solidFill>
+                  <a:srgbClr val="0070C0"/>
+                </a:solidFill>
+              </a:endParaRPr>
+            </a:p>
+          </p:txBody>
+        </p:sp>
+        <p:sp>
+          <p:nvSpPr>
+            <p:cNvPr id="42" name="Rounded Rectangle 41"/>
+            <p:cNvSpPr/>
+            <p:nvPr/>
+          </p:nvSpPr>
+          <p:spPr>
+            <a:xfrm>
+              <a:off x="6376994" y="4716221"/>
+              <a:ext cx="1700202" cy="242837"/>
+            </a:xfrm>
+            <a:prstGeom prst="roundRect">
+              <a:avLst>
+                <a:gd name="adj" fmla="val 50000"/>
+              </a:avLst>
+            </a:prstGeom>
+            <a:solidFill>
+              <a:srgbClr val="0070C0"/>
+            </a:solidFill>
+            <a:ln>
+              <a:noFill/>
+            </a:ln>
+          </p:spPr>
+          <p:style>
+            <a:lnRef idx="2">
+              <a:schemeClr val="accent1">
+                <a:shade val="50000"/>
+              </a:schemeClr>
+            </a:lnRef>
+            <a:fillRef idx="1">
+              <a:schemeClr val="accent1"/>
+            </a:fillRef>
+            <a:effectRef idx="0">
+              <a:schemeClr val="accent1"/>
+            </a:effectRef>
+            <a:fontRef idx="minor">
+              <a:schemeClr val="lt1"/>
+            </a:fontRef>
+          </p:style>
+          <p:txBody>
+            <a:bodyPr rtlCol="0" anchor="ctr"/>
+            <a:lstStyle/>
+            <a:p>
+              <a:pPr algn="ctr"/>
+              <a:r>
+                <a:rPr lang="en-US" sz="1200" dirty="0" smtClean="0"/>
+                <a:t>Preview as Instructor</a:t>
+              </a:r>
+              <a:endParaRPr lang="en-SG" sz="1200" dirty="0"/>
+            </a:p>
+          </p:txBody>
+        </p:sp>
+        <p:pic>
+          <p:nvPicPr>
+            <p:cNvPr id="43" name="Picture 42"/>
+            <p:cNvPicPr>
+              <a:picLocks noChangeAspect="1" noChangeArrowheads="1"/>
+            </p:cNvPicPr>
+            <p:nvPr/>
+          </p:nvPicPr>
+          <p:blipFill rotWithShape="1">
+            <a:blip r:embed="rId3">
+              <a:extLst>
+                <a:ext uri="{28A0092B-C50C-407E-A947-70E740481C1C}">
+                  <a14:useLocalDpi xmlns:a14="http://schemas.microsoft.com/office/drawing/2010/main" val="0"/>
+                </a:ext>
+              </a:extLst>
+            </a:blip>
+            <a:srcRect l="88315"/>
+            <a:stretch/>
+          </p:blipFill>
+          <p:spPr bwMode="auto">
+            <a:xfrm>
+              <a:off x="6044605" y="4705045"/>
+              <a:ext cx="200657" cy="230505"/>
+            </a:xfrm>
+            <a:prstGeom prst="rect">
+              <a:avLst/>
+            </a:prstGeom>
+            <a:noFill/>
+            <a:ln>
+              <a:noFill/>
+            </a:ln>
+            <a:extLst>
+              <a:ext uri="{909E8E84-426E-40DD-AFC4-6F175D3DCCD1}">
+                <a14:hiddenFill xmlns:a14="http://schemas.microsoft.com/office/drawing/2010/main">
+                  <a:solidFill>
+                    <a:schemeClr val="accent1"/>
+                  </a:solidFill>
+                </a14:hiddenFill>
+              </a:ext>
+              <a:ext uri="{91240B29-F687-4F45-9708-019B960494DF}">
+                <a14:hiddenLine xmlns:a14="http://schemas.microsoft.com/office/drawing/2010/main" w="9525">
+                  <a:solidFill>
+                    <a:schemeClr val="tx1"/>
+                  </a:solidFill>
+                  <a:miter lim="800000"/>
+                  <a:headEnd/>
+                  <a:tailEnd/>
+                </a14:hiddenLine>
+              </a:ext>
+            </a:extLst>
+          </p:spPr>
+        </p:pic>
+        <p:sp>
+          <p:nvSpPr>
+            <p:cNvPr id="44" name="Rectangle 43"/>
+            <p:cNvSpPr/>
+            <p:nvPr/>
+          </p:nvSpPr>
+          <p:spPr>
+            <a:xfrm>
+              <a:off x="2996686" y="4716221"/>
+              <a:ext cx="3065331" cy="201486"/>
+            </a:xfrm>
+            <a:prstGeom prst="rect">
+              <a:avLst/>
+            </a:prstGeom>
+            <a:solidFill>
+              <a:schemeClr val="bg1"/>
+            </a:solidFill>
+            <a:ln w="9525">
+              <a:solidFill>
+                <a:schemeClr val="bg1">
+                  <a:lumMod val="75000"/>
+                </a:schemeClr>
+              </a:solidFill>
+            </a:ln>
+          </p:spPr>
+          <p:style>
+            <a:lnRef idx="2">
+              <a:schemeClr val="accent1">
+                <a:shade val="50000"/>
+              </a:schemeClr>
+            </a:lnRef>
+            <a:fillRef idx="1">
+              <a:schemeClr val="accent1"/>
+            </a:fillRef>
+            <a:effectRef idx="0">
+              <a:schemeClr val="accent1"/>
+            </a:effectRef>
+            <a:fontRef idx="minor">
+              <a:schemeClr val="lt1"/>
+            </a:fontRef>
+          </p:style>
+          <p:txBody>
+            <a:bodyPr lIns="0" tIns="0" rIns="0" bIns="0" rtlCol="0" anchor="ctr"/>
+            <a:lstStyle/>
+            <a:p>
+              <a:r>
+                <a:rPr lang="en-US" sz="1200" dirty="0" smtClean="0">
+                  <a:solidFill>
+                    <a:srgbClr val="0070C0"/>
+                  </a:solidFill>
+                </a:rPr>
+                <a:t> Tutor James </a:t>
+              </a:r>
+              <a:r>
+                <a:rPr lang="en-US" sz="1200" dirty="0" err="1" smtClean="0">
+                  <a:solidFill>
+                    <a:srgbClr val="0070C0"/>
+                  </a:solidFill>
+                </a:rPr>
+                <a:t>Hamler</a:t>
+              </a:r>
+              <a:endParaRPr lang="en-SG" sz="1200" dirty="0">
+                <a:solidFill>
+                  <a:srgbClr val="0070C0"/>
+                </a:solidFill>
+              </a:endParaRPr>
+            </a:p>
+          </p:txBody>
+        </p:sp>
+      </p:grpSp>
+    </p:spTree>
+    <p:extLst>
+      <p:ext uri="{BB962C8B-B14F-4D97-AF65-F5344CB8AC3E}">
+        <p14:creationId xmlns:p14="http://schemas.microsoft.com/office/powerpoint/2010/main" val="3725714564"/>
+      </p:ext>
+    </p:extLst>
+  </p:cSld>
+  <p:clrMapOvr>
+    <a:masterClrMapping/>
+  </p:clrMapOvr>
+</p:sld>
+</file>
+
+<file path=ppt/slides/slide11.xml><?xml version="1.0" encoding="utf-8"?>
+<p:sld xmlns:a="http://schemas.openxmlformats.org/drawingml/2006/main" xmlns:r="http://schemas.openxmlformats.org/officeDocument/2006/relationships" xmlns:p="http://schemas.openxmlformats.org/presentationml/2006/main">
+  <p:cSld>
+    <p:spTree>
+      <p:nvGrpSpPr>
+        <p:cNvPr id="1" name=""/>
+        <p:cNvGrpSpPr/>
+        <p:nvPr/>
+      </p:nvGrpSpPr>
+      <p:grpSpPr>
+        <a:xfrm>
+          <a:off x="0" y="0"/>
+          <a:ext cx="0" cy="0"/>
+          <a:chOff x="0" y="0"/>
+          <a:chExt cx="0" cy="0"/>
+        </a:xfrm>
+      </p:grpSpPr>
+      <p:grpSp>
+        <p:nvGrpSpPr>
+          <p:cNvPr id="9" name="Group 8"/>
+          <p:cNvGrpSpPr/>
+          <p:nvPr/>
+        </p:nvGrpSpPr>
+        <p:grpSpPr>
+          <a:xfrm>
+            <a:off x="1103745" y="1361512"/>
+            <a:ext cx="6934200" cy="3886200"/>
+            <a:chOff x="1103745" y="1361512"/>
+            <a:chExt cx="6934200" cy="3886200"/>
+          </a:xfrm>
+        </p:grpSpPr>
+        <p:sp>
+          <p:nvSpPr>
+            <p:cNvPr id="3" name="Rounded Rectangle 2"/>
+            <p:cNvSpPr/>
+            <p:nvPr/>
+          </p:nvSpPr>
+          <p:spPr>
+            <a:xfrm>
+              <a:off x="1103745" y="1361512"/>
+              <a:ext cx="6934200" cy="3886200"/>
+            </a:xfrm>
+            <a:prstGeom prst="roundRect">
+              <a:avLst>
+                <a:gd name="adj" fmla="val 2849"/>
+              </a:avLst>
+            </a:prstGeom>
+            <a:solidFill>
+              <a:srgbClr val="E6EDF6"/>
+            </a:solidFill>
+            <a:ln>
+              <a:noFill/>
+            </a:ln>
+          </p:spPr>
+          <p:style>
+            <a:lnRef idx="2">
+              <a:schemeClr val="accent1">
+                <a:shade val="50000"/>
+              </a:schemeClr>
+            </a:lnRef>
+            <a:fillRef idx="1">
+              <a:schemeClr val="accent1"/>
+            </a:fillRef>
+            <a:effectRef idx="0">
+              <a:schemeClr val="accent1"/>
+            </a:effectRef>
+            <a:fontRef idx="minor">
+              <a:schemeClr val="lt1"/>
+            </a:fontRef>
+          </p:style>
+          <p:txBody>
+            <a:bodyPr rtlCol="0" anchor="ctr"/>
+            <a:lstStyle/>
+            <a:p>
+              <a:pPr algn="ctr"/>
+              <a:endParaRPr lang="en-SG"/>
+            </a:p>
+          </p:txBody>
+        </p:sp>
+        <p:sp>
+          <p:nvSpPr>
+            <p:cNvPr id="5" name="TextBox 4"/>
+            <p:cNvSpPr txBox="1"/>
+            <p:nvPr/>
+          </p:nvSpPr>
+          <p:spPr>
+            <a:xfrm>
+              <a:off x="1135557" y="3037912"/>
+              <a:ext cx="1371600" cy="246221"/>
+            </a:xfrm>
+            <a:prstGeom prst="rect">
+              <a:avLst/>
+            </a:prstGeom>
+            <a:noFill/>
+          </p:spPr>
+          <p:txBody>
+            <a:bodyPr wrap="square" rtlCol="0">
+              <a:spAutoFit/>
+            </a:bodyPr>
+            <a:lstStyle/>
+            <a:p>
+              <a:pPr algn="r"/>
+              <a:r>
+                <a:rPr lang="en-US" sz="1000" b="1" dirty="0" smtClean="0">
+                  <a:solidFill>
+                    <a:schemeClr val="tx1">
+                      <a:lumMod val="50000"/>
+                      <a:lumOff val="50000"/>
+                    </a:schemeClr>
+                  </a:solidFill>
+                  <a:latin typeface="Verdana" panose="020B0604030504040204" pitchFamily="34" charset="0"/>
+                  <a:ea typeface="Verdana" panose="020B0604030504040204" pitchFamily="34" charset="0"/>
+                  <a:cs typeface="Verdana" panose="020B0604030504040204" pitchFamily="34" charset="0"/>
+                </a:rPr>
+                <a:t>Feedback giver:</a:t>
+              </a:r>
+              <a:endParaRPr lang="en-SG" sz="1000" b="1" dirty="0">
+                <a:solidFill>
+                  <a:schemeClr val="tx1">
+                    <a:lumMod val="50000"/>
+                    <a:lumOff val="50000"/>
+                  </a:schemeClr>
+                </a:solidFill>
+                <a:latin typeface="Verdana" panose="020B0604030504040204" pitchFamily="34" charset="0"/>
+                <a:ea typeface="Verdana" panose="020B0604030504040204" pitchFamily="34" charset="0"/>
+                <a:cs typeface="Verdana" panose="020B0604030504040204" pitchFamily="34" charset="0"/>
+              </a:endParaRPr>
+            </a:p>
+          </p:txBody>
+        </p:sp>
+        <p:sp>
+          <p:nvSpPr>
+            <p:cNvPr id="7" name="Rectangle 6"/>
+            <p:cNvSpPr/>
+            <p:nvPr/>
+          </p:nvSpPr>
+          <p:spPr>
+            <a:xfrm>
+              <a:off x="1287957" y="1818712"/>
+              <a:ext cx="6597588" cy="381000"/>
+            </a:xfrm>
+            <a:prstGeom prst="rect">
+              <a:avLst/>
+            </a:prstGeom>
+            <a:solidFill>
+              <a:schemeClr val="bg1"/>
+            </a:solidFill>
+            <a:ln w="9525">
+              <a:solidFill>
+                <a:schemeClr val="bg1">
+                  <a:lumMod val="75000"/>
+                </a:schemeClr>
+              </a:solidFill>
+            </a:ln>
+          </p:spPr>
+          <p:style>
+            <a:lnRef idx="2">
+              <a:schemeClr val="accent1">
+                <a:shade val="50000"/>
+              </a:schemeClr>
+            </a:lnRef>
+            <a:fillRef idx="1">
+              <a:schemeClr val="accent1"/>
+            </a:fillRef>
+            <a:effectRef idx="0">
+              <a:schemeClr val="accent1"/>
+            </a:effectRef>
+            <a:fontRef idx="minor">
+              <a:schemeClr val="lt1"/>
+            </a:fontRef>
+          </p:style>
+          <p:txBody>
+            <a:bodyPr rtlCol="0" anchor="ctr"/>
+            <a:lstStyle/>
+            <a:p>
+              <a:pPr lvl="0"/>
+              <a:r>
+                <a:rPr lang="en-US" sz="1200" b="1" dirty="0" smtClean="0">
+                  <a:solidFill>
+                    <a:srgbClr val="0070C0"/>
+                  </a:solidFill>
+                  <a:latin typeface="Consolas" panose="020B0609020204030204" pitchFamily="49" charset="0"/>
+                  <a:cs typeface="Consolas" panose="020B0609020204030204" pitchFamily="49" charset="0"/>
+                </a:rPr>
+                <a:t>Whose presentation did you like the best?</a:t>
+              </a:r>
+              <a:endParaRPr lang="en-SG" sz="1200" b="1" dirty="0">
+                <a:solidFill>
+                  <a:srgbClr val="0070C0"/>
+                </a:solidFill>
+                <a:latin typeface="Consolas" panose="020B0609020204030204" pitchFamily="49" charset="0"/>
+                <a:cs typeface="Consolas" panose="020B0609020204030204" pitchFamily="49" charset="0"/>
+              </a:endParaRPr>
+            </a:p>
+          </p:txBody>
+        </p:sp>
+        <p:sp>
+          <p:nvSpPr>
+            <p:cNvPr id="10" name="TextBox 9"/>
+            <p:cNvSpPr txBox="1"/>
+            <p:nvPr/>
+          </p:nvSpPr>
+          <p:spPr>
+            <a:xfrm>
+              <a:off x="1211757" y="1434280"/>
+              <a:ext cx="2286000" cy="246221"/>
+            </a:xfrm>
+            <a:prstGeom prst="rect">
+              <a:avLst/>
+            </a:prstGeom>
+            <a:noFill/>
+          </p:spPr>
+          <p:txBody>
+            <a:bodyPr wrap="square" rtlCol="0">
+              <a:spAutoFit/>
+            </a:bodyPr>
+            <a:lstStyle>
+              <a:defPPr>
+                <a:defRPr lang="en-US"/>
+              </a:defPPr>
+              <a:lvl1pPr algn="r">
+                <a:defRPr sz="1000" b="1">
+                  <a:solidFill>
+                    <a:schemeClr val="tx1">
+                      <a:lumMod val="50000"/>
+                      <a:lumOff val="50000"/>
+                    </a:schemeClr>
+                  </a:solidFill>
+                  <a:latin typeface="Verdana" panose="020B0604030504040204" pitchFamily="34" charset="0"/>
+                  <a:ea typeface="Verdana" panose="020B0604030504040204" pitchFamily="34" charset="0"/>
+                  <a:cs typeface="Verdana" panose="020B0604030504040204" pitchFamily="34" charset="0"/>
+                </a:defRPr>
+              </a:lvl1pPr>
+            </a:lstStyle>
+            <a:p>
+              <a:pPr algn="l"/>
+              <a:r>
+                <a:rPr lang="en-US" dirty="0">
+                  <a:solidFill>
+                    <a:schemeClr val="tx1"/>
+                  </a:solidFill>
+                </a:rPr>
+                <a:t>Question </a:t>
+              </a:r>
+              <a:r>
+                <a:rPr lang="en-US" dirty="0" smtClean="0">
+                  <a:solidFill>
+                    <a:schemeClr val="tx1"/>
+                  </a:solidFill>
+                </a:rPr>
+                <a:t>6:  </a:t>
+              </a:r>
+              <a:r>
+                <a:rPr lang="en-US" dirty="0" smtClean="0"/>
+                <a:t>MCQ </a:t>
+              </a:r>
+              <a:r>
+                <a:rPr lang="en-US" dirty="0"/>
+                <a:t>question</a:t>
+              </a:r>
+              <a:endParaRPr lang="en-SG" dirty="0"/>
+            </a:p>
+          </p:txBody>
+        </p:sp>
+        <p:grpSp>
+          <p:nvGrpSpPr>
+            <p:cNvPr id="42" name="Group 41"/>
+            <p:cNvGrpSpPr/>
+            <p:nvPr/>
+          </p:nvGrpSpPr>
+          <p:grpSpPr>
+            <a:xfrm>
+              <a:off x="2442505" y="3063354"/>
+              <a:ext cx="1613204" cy="190500"/>
+              <a:chOff x="2362200" y="1357786"/>
+              <a:chExt cx="1613204" cy="190500"/>
+            </a:xfrm>
+          </p:grpSpPr>
+          <p:pic>
+            <p:nvPicPr>
+              <p:cNvPr id="4" name="Picture 3"/>
+              <p:cNvPicPr>
+                <a:picLocks noChangeAspect="1" noChangeArrowheads="1"/>
+              </p:cNvPicPr>
+              <p:nvPr/>
+            </p:nvPicPr>
+            <p:blipFill rotWithShape="1">
+              <a:blip r:embed="rId3">
+                <a:extLst>
+                  <a:ext uri="{28A0092B-C50C-407E-A947-70E740481C1C}">
+                    <a14:useLocalDpi xmlns:a14="http://schemas.microsoft.com/office/drawing/2010/main" val="0"/>
+                  </a:ext>
+                </a:extLst>
+              </a:blip>
+              <a:srcRect l="88315"/>
+              <a:stretch/>
+            </p:blipFill>
+            <p:spPr bwMode="auto">
+              <a:xfrm>
+                <a:off x="3809572" y="1357786"/>
+                <a:ext cx="165832" cy="190500"/>
+              </a:xfrm>
+              <a:prstGeom prst="rect">
+                <a:avLst/>
+              </a:prstGeom>
+              <a:noFill/>
+              <a:ln>
+                <a:noFill/>
+              </a:ln>
+              <a:extLst>
+                <a:ext uri="{909E8E84-426E-40DD-AFC4-6F175D3DCCD1}">
+                  <a14:hiddenFill xmlns:a14="http://schemas.microsoft.com/office/drawing/2010/main">
+                    <a:solidFill>
+                      <a:schemeClr val="accent1"/>
+                    </a:solidFill>
+                  </a14:hiddenFill>
+                </a:ext>
+                <a:ext uri="{91240B29-F687-4F45-9708-019B960494DF}">
+                  <a14:hiddenLine xmlns:a14="http://schemas.microsoft.com/office/drawing/2010/main" w="9525">
+                    <a:solidFill>
+                      <a:schemeClr val="tx1"/>
+                    </a:solidFill>
+                    <a:miter lim="800000"/>
+                    <a:headEnd/>
+                    <a:tailEnd/>
+                  </a14:hiddenLine>
+                </a:ext>
+              </a:extLst>
+            </p:spPr>
+          </p:pic>
+          <p:sp>
+            <p:nvSpPr>
+              <p:cNvPr id="14" name="Rectangle 13"/>
+              <p:cNvSpPr/>
+              <p:nvPr/>
+            </p:nvSpPr>
+            <p:spPr>
+              <a:xfrm>
+                <a:off x="2362200" y="1366445"/>
+                <a:ext cx="1447800" cy="173182"/>
+              </a:xfrm>
+              <a:prstGeom prst="rect">
+                <a:avLst/>
+              </a:prstGeom>
+              <a:solidFill>
+                <a:schemeClr val="bg1"/>
+              </a:solidFill>
+              <a:ln w="9525">
+                <a:solidFill>
+                  <a:schemeClr val="bg1">
+                    <a:lumMod val="75000"/>
+                  </a:schemeClr>
+                </a:solidFill>
+              </a:ln>
+            </p:spPr>
+            <p:style>
+              <a:lnRef idx="2">
+                <a:schemeClr val="accent1">
+                  <a:shade val="50000"/>
+                </a:schemeClr>
+              </a:lnRef>
+              <a:fillRef idx="1">
+                <a:schemeClr val="accent1"/>
+              </a:fillRef>
+              <a:effectRef idx="0">
+                <a:schemeClr val="accent1"/>
+              </a:effectRef>
+              <a:fontRef idx="minor">
+                <a:schemeClr val="lt1"/>
+              </a:fontRef>
+            </p:style>
+            <p:txBody>
+              <a:bodyPr lIns="0" tIns="0" rIns="0" bIns="0" rtlCol="0" anchor="ctr"/>
+              <a:lstStyle/>
+              <a:p>
+                <a:r>
+                  <a:rPr lang="en-US" sz="1050" b="1" dirty="0" smtClean="0">
+                    <a:solidFill>
+                      <a:srgbClr val="0070C0"/>
+                    </a:solidFill>
+                  </a:rPr>
+                  <a:t> Students in this course</a:t>
+                </a:r>
+                <a:endParaRPr lang="en-SG" sz="1050" b="1" dirty="0">
+                  <a:solidFill>
+                    <a:srgbClr val="0070C0"/>
+                  </a:solidFill>
+                </a:endParaRPr>
+              </a:p>
+            </p:txBody>
+          </p:sp>
+        </p:grpSp>
+        <p:sp>
+          <p:nvSpPr>
+            <p:cNvPr id="16" name="TextBox 15"/>
+            <p:cNvSpPr txBox="1"/>
+            <p:nvPr/>
+          </p:nvSpPr>
+          <p:spPr>
+            <a:xfrm>
+              <a:off x="4140603" y="3037912"/>
+              <a:ext cx="1624682" cy="246221"/>
+            </a:xfrm>
+            <a:prstGeom prst="rect">
+              <a:avLst/>
+            </a:prstGeom>
+            <a:noFill/>
+          </p:spPr>
+          <p:txBody>
+            <a:bodyPr wrap="square" rtlCol="0">
+              <a:spAutoFit/>
+            </a:bodyPr>
+            <a:lstStyle/>
+            <a:p>
+              <a:pPr algn="r"/>
+              <a:r>
+                <a:rPr lang="en-US" sz="1000" b="1" dirty="0" smtClean="0">
+                  <a:solidFill>
+                    <a:schemeClr val="tx1">
+                      <a:lumMod val="50000"/>
+                      <a:lumOff val="50000"/>
+                    </a:schemeClr>
+                  </a:solidFill>
+                  <a:latin typeface="Verdana" panose="020B0604030504040204" pitchFamily="34" charset="0"/>
+                  <a:ea typeface="Verdana" panose="020B0604030504040204" pitchFamily="34" charset="0"/>
+                  <a:cs typeface="Verdana" panose="020B0604030504040204" pitchFamily="34" charset="0"/>
+                </a:rPr>
+                <a:t>Feedback recipient:</a:t>
+              </a:r>
+              <a:endParaRPr lang="en-SG" sz="1000" b="1" dirty="0">
+                <a:solidFill>
+                  <a:schemeClr val="tx1">
+                    <a:lumMod val="50000"/>
+                    <a:lumOff val="50000"/>
+                  </a:schemeClr>
+                </a:solidFill>
+                <a:latin typeface="Verdana" panose="020B0604030504040204" pitchFamily="34" charset="0"/>
+                <a:ea typeface="Verdana" panose="020B0604030504040204" pitchFamily="34" charset="0"/>
+                <a:cs typeface="Verdana" panose="020B0604030504040204" pitchFamily="34" charset="0"/>
+              </a:endParaRPr>
+            </a:p>
+          </p:txBody>
+        </p:sp>
+        <p:grpSp>
+          <p:nvGrpSpPr>
+            <p:cNvPr id="37" name="Group 36"/>
+            <p:cNvGrpSpPr/>
+            <p:nvPr/>
+          </p:nvGrpSpPr>
+          <p:grpSpPr>
+            <a:xfrm>
+              <a:off x="5694553" y="3063354"/>
+              <a:ext cx="2146604" cy="190500"/>
+              <a:chOff x="5549596" y="1364451"/>
+              <a:chExt cx="2146604" cy="190500"/>
+            </a:xfrm>
+          </p:grpSpPr>
+          <p:pic>
+            <p:nvPicPr>
+              <p:cNvPr id="15" name="Picture 14"/>
+              <p:cNvPicPr>
+                <a:picLocks noChangeAspect="1" noChangeArrowheads="1"/>
+              </p:cNvPicPr>
+              <p:nvPr/>
+            </p:nvPicPr>
+            <p:blipFill rotWithShape="1">
+              <a:blip r:embed="rId3">
+                <a:extLst>
+                  <a:ext uri="{28A0092B-C50C-407E-A947-70E740481C1C}">
+                    <a14:useLocalDpi xmlns:a14="http://schemas.microsoft.com/office/drawing/2010/main" val="0"/>
+                  </a:ext>
+                </a:extLst>
+              </a:blip>
+              <a:srcRect l="88315"/>
+              <a:stretch/>
+            </p:blipFill>
+            <p:spPr bwMode="auto">
+              <a:xfrm>
+                <a:off x="7530368" y="1364451"/>
+                <a:ext cx="165832" cy="190500"/>
+              </a:xfrm>
+              <a:prstGeom prst="rect">
+                <a:avLst/>
+              </a:prstGeom>
+              <a:noFill/>
+              <a:ln>
+                <a:noFill/>
+              </a:ln>
+              <a:extLst>
+                <a:ext uri="{909E8E84-426E-40DD-AFC4-6F175D3DCCD1}">
+                  <a14:hiddenFill xmlns:a14="http://schemas.microsoft.com/office/drawing/2010/main">
+                    <a:solidFill>
+                      <a:schemeClr val="accent1"/>
+                    </a:solidFill>
+                  </a14:hiddenFill>
+                </a:ext>
+                <a:ext uri="{91240B29-F687-4F45-9708-019B960494DF}">
+                  <a14:hiddenLine xmlns:a14="http://schemas.microsoft.com/office/drawing/2010/main" w="9525">
+                    <a:solidFill>
+                      <a:schemeClr val="tx1"/>
+                    </a:solidFill>
+                    <a:miter lim="800000"/>
+                    <a:headEnd/>
+                    <a:tailEnd/>
+                  </a14:hiddenLine>
+                </a:ext>
+              </a:extLst>
+            </p:spPr>
+          </p:pic>
+          <p:sp>
+            <p:nvSpPr>
+              <p:cNvPr id="17" name="Rectangle 16"/>
+              <p:cNvSpPr/>
+              <p:nvPr/>
+            </p:nvSpPr>
+            <p:spPr>
+              <a:xfrm>
+                <a:off x="5549596" y="1373110"/>
+                <a:ext cx="1980772" cy="166517"/>
+              </a:xfrm>
+              <a:prstGeom prst="rect">
+                <a:avLst/>
+              </a:prstGeom>
+              <a:solidFill>
+                <a:schemeClr val="bg1"/>
+              </a:solidFill>
+              <a:ln w="9525">
+                <a:solidFill>
+                  <a:schemeClr val="bg1">
+                    <a:lumMod val="75000"/>
+                  </a:schemeClr>
+                </a:solidFill>
+              </a:ln>
+            </p:spPr>
+            <p:style>
+              <a:lnRef idx="2">
+                <a:schemeClr val="accent1">
+                  <a:shade val="50000"/>
+                </a:schemeClr>
+              </a:lnRef>
+              <a:fillRef idx="1">
+                <a:schemeClr val="accent1"/>
+              </a:fillRef>
+              <a:effectRef idx="0">
+                <a:schemeClr val="accent1"/>
+              </a:effectRef>
+              <a:fontRef idx="minor">
+                <a:schemeClr val="lt1"/>
+              </a:fontRef>
+            </p:style>
+            <p:txBody>
+              <a:bodyPr lIns="0" tIns="0" rIns="0" bIns="0" rtlCol="0" anchor="ctr"/>
+              <a:lstStyle/>
+              <a:p>
+                <a:r>
+                  <a:rPr lang="en-US" sz="1050" b="1" dirty="0" smtClean="0">
+                    <a:solidFill>
+                      <a:srgbClr val="0070C0"/>
+                    </a:solidFill>
+                  </a:rPr>
+                  <a:t> Giver’s team members</a:t>
+                </a:r>
+                <a:endParaRPr lang="en-SG" sz="1050" b="1" dirty="0">
+                  <a:solidFill>
+                    <a:srgbClr val="0070C0"/>
+                  </a:solidFill>
+                </a:endParaRPr>
+              </a:p>
+            </p:txBody>
+          </p:sp>
+        </p:grpSp>
+        <p:pic>
+          <p:nvPicPr>
+            <p:cNvPr id="5123" name="Picture 3"/>
+            <p:cNvPicPr>
+              <a:picLocks noChangeAspect="1" noChangeArrowheads="1"/>
+            </p:cNvPicPr>
+            <p:nvPr/>
+          </p:nvPicPr>
+          <p:blipFill>
+            <a:blip r:embed="rId4">
+              <a:extLst>
+                <a:ext uri="{28A0092B-C50C-407E-A947-70E740481C1C}">
+                  <a14:useLocalDpi xmlns:a14="http://schemas.microsoft.com/office/drawing/2010/main" val="0"/>
+                </a:ext>
+              </a:extLst>
+            </a:blip>
+            <a:srcRect/>
+            <a:stretch>
+              <a:fillRect/>
+            </a:stretch>
+          </p:blipFill>
+          <p:spPr bwMode="auto">
+            <a:xfrm>
+              <a:off x="1238744" y="3380970"/>
+              <a:ext cx="6602413" cy="1731963"/>
+            </a:xfrm>
+            <a:prstGeom prst="rect">
+              <a:avLst/>
+            </a:prstGeom>
+            <a:noFill/>
+            <a:ln>
+              <a:noFill/>
+            </a:ln>
+            <a:effectLst/>
+            <a:extLst>
+              <a:ext uri="{909E8E84-426E-40DD-AFC4-6F175D3DCCD1}">
+                <a14:hiddenFill xmlns:a14="http://schemas.microsoft.com/office/drawing/2010/main">
+                  <a:solidFill>
+                    <a:schemeClr val="accent1"/>
+                  </a:solidFill>
+                </a14:hiddenFill>
+              </a:ext>
+              <a:ext uri="{91240B29-F687-4F45-9708-019B960494DF}">
+                <a14:hiddenLine xmlns:a14="http://schemas.microsoft.com/office/drawing/2010/main" w="9525">
+                  <a:solidFill>
+                    <a:schemeClr val="tx1"/>
+                  </a:solidFill>
+                  <a:miter lim="800000"/>
+                  <a:headEnd/>
+                  <a:tailEnd/>
+                </a14:hiddenLine>
+              </a:ext>
+              <a:ext uri="{AF507438-7753-43E0-B8FC-AC1667EBCBE1}">
+                <a14:hiddenEffects xmlns:a14="http://schemas.microsoft.com/office/drawing/2010/main">
+                  <a:effectLst>
+                    <a:outerShdw dist="35921" dir="2700000" algn="ctr" rotWithShape="0">
+                      <a:schemeClr val="bg2"/>
+                    </a:outerShdw>
+                  </a:effectLst>
+                </a14:hiddenEffects>
+              </a:ext>
+            </a:extLst>
+          </p:spPr>
+        </p:pic>
+        <p:grpSp>
+          <p:nvGrpSpPr>
+            <p:cNvPr id="43" name="Group 42"/>
+            <p:cNvGrpSpPr/>
+            <p:nvPr/>
+          </p:nvGrpSpPr>
+          <p:grpSpPr>
+            <a:xfrm>
+              <a:off x="3887854" y="3716652"/>
+              <a:ext cx="133350" cy="1347788"/>
+              <a:chOff x="3951469" y="4419600"/>
+              <a:chExt cx="133350" cy="1347788"/>
+            </a:xfrm>
+          </p:grpSpPr>
+          <p:pic>
+            <p:nvPicPr>
+              <p:cNvPr id="44" name="Picture 2"/>
+              <p:cNvPicPr>
+                <a:picLocks noChangeAspect="1" noChangeArrowheads="1"/>
+              </p:cNvPicPr>
+              <p:nvPr/>
+            </p:nvPicPr>
+            <p:blipFill>
+              <a:blip r:embed="rId5">
+                <a:extLst>
+                  <a:ext uri="{28A0092B-C50C-407E-A947-70E740481C1C}">
+                    <a14:useLocalDpi xmlns:a14="http://schemas.microsoft.com/office/drawing/2010/main" val="0"/>
+                  </a:ext>
+                </a:extLst>
+              </a:blip>
+              <a:srcRect/>
+              <a:stretch>
+                <a:fillRect/>
+              </a:stretch>
+            </p:blipFill>
+            <p:spPr bwMode="auto">
+              <a:xfrm>
+                <a:off x="3951469" y="4419600"/>
+                <a:ext cx="133350" cy="128588"/>
+              </a:xfrm>
+              <a:prstGeom prst="rect">
+                <a:avLst/>
+              </a:prstGeom>
+              <a:noFill/>
+              <a:ln>
+                <a:noFill/>
+              </a:ln>
+              <a:extLst>
+                <a:ext uri="{909E8E84-426E-40DD-AFC4-6F175D3DCCD1}">
+                  <a14:hiddenFill xmlns:a14="http://schemas.microsoft.com/office/drawing/2010/main">
+                    <a:solidFill>
+                      <a:schemeClr val="accent1"/>
+                    </a:solidFill>
+                  </a14:hiddenFill>
+                </a:ext>
+                <a:ext uri="{91240B29-F687-4F45-9708-019B960494DF}">
+                  <a14:hiddenLine xmlns:a14="http://schemas.microsoft.com/office/drawing/2010/main" w="9525">
+                    <a:solidFill>
+                      <a:schemeClr val="tx1"/>
+                    </a:solidFill>
+                    <a:miter lim="800000"/>
+                    <a:headEnd/>
+                    <a:tailEnd/>
+                  </a14:hiddenLine>
+                </a:ext>
+              </a:extLst>
+            </p:spPr>
+          </p:pic>
+          <p:pic>
+            <p:nvPicPr>
+              <p:cNvPr id="45" name="Picture 2"/>
+              <p:cNvPicPr>
+                <a:picLocks noChangeAspect="1" noChangeArrowheads="1"/>
+              </p:cNvPicPr>
+              <p:nvPr/>
+            </p:nvPicPr>
+            <p:blipFill>
+              <a:blip r:embed="rId5">
+                <a:extLst>
+                  <a:ext uri="{28A0092B-C50C-407E-A947-70E740481C1C}">
+                    <a14:useLocalDpi xmlns:a14="http://schemas.microsoft.com/office/drawing/2010/main" val="0"/>
+                  </a:ext>
+                </a:extLst>
+              </a:blip>
+              <a:srcRect/>
+              <a:stretch>
+                <a:fillRect/>
+              </a:stretch>
+            </p:blipFill>
+            <p:spPr bwMode="auto">
+              <a:xfrm>
+                <a:off x="3951469" y="4724400"/>
+                <a:ext cx="133350" cy="128588"/>
+              </a:xfrm>
+              <a:prstGeom prst="rect">
+                <a:avLst/>
+              </a:prstGeom>
+              <a:noFill/>
+              <a:ln>
+                <a:noFill/>
+              </a:ln>
+              <a:extLst>
+                <a:ext uri="{909E8E84-426E-40DD-AFC4-6F175D3DCCD1}">
+                  <a14:hiddenFill xmlns:a14="http://schemas.microsoft.com/office/drawing/2010/main">
+                    <a:solidFill>
+                      <a:schemeClr val="accent1"/>
+                    </a:solidFill>
+                  </a14:hiddenFill>
+                </a:ext>
+                <a:ext uri="{91240B29-F687-4F45-9708-019B960494DF}">
+                  <a14:hiddenLine xmlns:a14="http://schemas.microsoft.com/office/drawing/2010/main" w="9525">
+                    <a:solidFill>
+                      <a:schemeClr val="tx1"/>
+                    </a:solidFill>
+                    <a:miter lim="800000"/>
+                    <a:headEnd/>
+                    <a:tailEnd/>
+                  </a14:hiddenLine>
+                </a:ext>
+              </a:extLst>
+            </p:spPr>
+          </p:pic>
+          <p:pic>
+            <p:nvPicPr>
+              <p:cNvPr id="46" name="Picture 2"/>
+              <p:cNvPicPr>
+                <a:picLocks noChangeAspect="1" noChangeArrowheads="1"/>
+              </p:cNvPicPr>
+              <p:nvPr/>
+            </p:nvPicPr>
+            <p:blipFill>
+              <a:blip r:embed="rId5">
+                <a:extLst>
+                  <a:ext uri="{28A0092B-C50C-407E-A947-70E740481C1C}">
+                    <a14:useLocalDpi xmlns:a14="http://schemas.microsoft.com/office/drawing/2010/main" val="0"/>
+                  </a:ext>
+                </a:extLst>
+              </a:blip>
+              <a:srcRect/>
+              <a:stretch>
+                <a:fillRect/>
+              </a:stretch>
+            </p:blipFill>
+            <p:spPr bwMode="auto">
+              <a:xfrm>
+                <a:off x="3951469" y="5029200"/>
+                <a:ext cx="133350" cy="128588"/>
+              </a:xfrm>
+              <a:prstGeom prst="rect">
+                <a:avLst/>
+              </a:prstGeom>
+              <a:noFill/>
+              <a:ln>
+                <a:noFill/>
+              </a:ln>
+              <a:extLst>
+                <a:ext uri="{909E8E84-426E-40DD-AFC4-6F175D3DCCD1}">
+                  <a14:hiddenFill xmlns:a14="http://schemas.microsoft.com/office/drawing/2010/main">
+                    <a:solidFill>
+                      <a:schemeClr val="accent1"/>
+                    </a:solidFill>
+                  </a14:hiddenFill>
+                </a:ext>
+                <a:ext uri="{91240B29-F687-4F45-9708-019B960494DF}">
+                  <a14:hiddenLine xmlns:a14="http://schemas.microsoft.com/office/drawing/2010/main" w="9525">
+                    <a:solidFill>
+                      <a:schemeClr val="tx1"/>
+                    </a:solidFill>
+                    <a:miter lim="800000"/>
+                    <a:headEnd/>
+                    <a:tailEnd/>
+                  </a14:hiddenLine>
+                </a:ext>
+              </a:extLst>
+            </p:spPr>
+          </p:pic>
+          <p:pic>
+            <p:nvPicPr>
+              <p:cNvPr id="47" name="Picture 2"/>
+              <p:cNvPicPr>
+                <a:picLocks noChangeAspect="1" noChangeArrowheads="1"/>
+              </p:cNvPicPr>
+              <p:nvPr/>
+            </p:nvPicPr>
+            <p:blipFill>
+              <a:blip r:embed="rId5">
+                <a:extLst>
+                  <a:ext uri="{28A0092B-C50C-407E-A947-70E740481C1C}">
+                    <a14:useLocalDpi xmlns:a14="http://schemas.microsoft.com/office/drawing/2010/main" val="0"/>
+                  </a:ext>
+                </a:extLst>
+              </a:blip>
+              <a:srcRect/>
+              <a:stretch>
+                <a:fillRect/>
+              </a:stretch>
+            </p:blipFill>
+            <p:spPr bwMode="auto">
+              <a:xfrm>
+                <a:off x="3951469" y="5334000"/>
+                <a:ext cx="133350" cy="128588"/>
+              </a:xfrm>
+              <a:prstGeom prst="rect">
+                <a:avLst/>
+              </a:prstGeom>
+              <a:noFill/>
+              <a:ln>
+                <a:noFill/>
+              </a:ln>
+              <a:extLst>
+                <a:ext uri="{909E8E84-426E-40DD-AFC4-6F175D3DCCD1}">
+                  <a14:hiddenFill xmlns:a14="http://schemas.microsoft.com/office/drawing/2010/main">
+                    <a:solidFill>
+                      <a:schemeClr val="accent1"/>
+                    </a:solidFill>
+                  </a14:hiddenFill>
+                </a:ext>
+                <a:ext uri="{91240B29-F687-4F45-9708-019B960494DF}">
+                  <a14:hiddenLine xmlns:a14="http://schemas.microsoft.com/office/drawing/2010/main" w="9525">
+                    <a:solidFill>
+                      <a:schemeClr val="tx1"/>
+                    </a:solidFill>
+                    <a:miter lim="800000"/>
+                    <a:headEnd/>
+                    <a:tailEnd/>
+                  </a14:hiddenLine>
+                </a:ext>
+              </a:extLst>
+            </p:spPr>
+          </p:pic>
+          <p:pic>
+            <p:nvPicPr>
+              <p:cNvPr id="48" name="Picture 2"/>
+              <p:cNvPicPr>
+                <a:picLocks noChangeAspect="1" noChangeArrowheads="1"/>
+              </p:cNvPicPr>
+              <p:nvPr/>
+            </p:nvPicPr>
+            <p:blipFill>
+              <a:blip r:embed="rId5">
+                <a:extLst>
+                  <a:ext uri="{28A0092B-C50C-407E-A947-70E740481C1C}">
+                    <a14:useLocalDpi xmlns:a14="http://schemas.microsoft.com/office/drawing/2010/main" val="0"/>
+                  </a:ext>
+                </a:extLst>
+              </a:blip>
+              <a:srcRect/>
+              <a:stretch>
+                <a:fillRect/>
+              </a:stretch>
+            </p:blipFill>
+            <p:spPr bwMode="auto">
+              <a:xfrm>
+                <a:off x="3951469" y="5638800"/>
+                <a:ext cx="133350" cy="128588"/>
+              </a:xfrm>
+              <a:prstGeom prst="rect">
+                <a:avLst/>
+              </a:prstGeom>
+              <a:noFill/>
+              <a:ln>
+                <a:noFill/>
+              </a:ln>
+              <a:extLst>
+                <a:ext uri="{909E8E84-426E-40DD-AFC4-6F175D3DCCD1}">
+                  <a14:hiddenFill xmlns:a14="http://schemas.microsoft.com/office/drawing/2010/main">
+                    <a:solidFill>
+                      <a:schemeClr val="accent1"/>
+                    </a:solidFill>
+                  </a14:hiddenFill>
+                </a:ext>
+                <a:ext uri="{91240B29-F687-4F45-9708-019B960494DF}">
+                  <a14:hiddenLine xmlns:a14="http://schemas.microsoft.com/office/drawing/2010/main" w="9525">
+                    <a:solidFill>
+                      <a:schemeClr val="tx1"/>
+                    </a:solidFill>
+                    <a:miter lim="800000"/>
+                    <a:headEnd/>
+                    <a:tailEnd/>
+                  </a14:hiddenLine>
+                </a:ext>
+              </a:extLst>
+            </p:spPr>
+          </p:pic>
+        </p:grpSp>
+        <p:grpSp>
+          <p:nvGrpSpPr>
+            <p:cNvPr id="49" name="Group 48"/>
+            <p:cNvGrpSpPr/>
+            <p:nvPr/>
+          </p:nvGrpSpPr>
+          <p:grpSpPr>
+            <a:xfrm>
+              <a:off x="5366811" y="3716652"/>
+              <a:ext cx="133350" cy="1347788"/>
+              <a:chOff x="3951469" y="4419600"/>
+              <a:chExt cx="133350" cy="1347788"/>
+            </a:xfrm>
+          </p:grpSpPr>
+          <p:pic>
+            <p:nvPicPr>
+              <p:cNvPr id="50" name="Picture 2"/>
+              <p:cNvPicPr>
+                <a:picLocks noChangeAspect="1" noChangeArrowheads="1"/>
+              </p:cNvPicPr>
+              <p:nvPr/>
+            </p:nvPicPr>
+            <p:blipFill>
+              <a:blip r:embed="rId5">
+                <a:extLst>
+                  <a:ext uri="{28A0092B-C50C-407E-A947-70E740481C1C}">
+                    <a14:useLocalDpi xmlns:a14="http://schemas.microsoft.com/office/drawing/2010/main" val="0"/>
+                  </a:ext>
+                </a:extLst>
+              </a:blip>
+              <a:srcRect/>
+              <a:stretch>
+                <a:fillRect/>
+              </a:stretch>
+            </p:blipFill>
+            <p:spPr bwMode="auto">
+              <a:xfrm>
+                <a:off x="3951469" y="4419600"/>
+                <a:ext cx="133350" cy="128588"/>
+              </a:xfrm>
+              <a:prstGeom prst="rect">
+                <a:avLst/>
+              </a:prstGeom>
+              <a:noFill/>
+              <a:ln>
+                <a:noFill/>
+              </a:ln>
+              <a:extLst>
+                <a:ext uri="{909E8E84-426E-40DD-AFC4-6F175D3DCCD1}">
+                  <a14:hiddenFill xmlns:a14="http://schemas.microsoft.com/office/drawing/2010/main">
+                    <a:solidFill>
+                      <a:schemeClr val="accent1"/>
+                    </a:solidFill>
+                  </a14:hiddenFill>
+                </a:ext>
+                <a:ext uri="{91240B29-F687-4F45-9708-019B960494DF}">
+                  <a14:hiddenLine xmlns:a14="http://schemas.microsoft.com/office/drawing/2010/main" w="9525">
+                    <a:solidFill>
+                      <a:schemeClr val="tx1"/>
+                    </a:solidFill>
+                    <a:miter lim="800000"/>
+                    <a:headEnd/>
+                    <a:tailEnd/>
+                  </a14:hiddenLine>
+                </a:ext>
+              </a:extLst>
+            </p:spPr>
+          </p:pic>
+          <p:pic>
+            <p:nvPicPr>
+              <p:cNvPr id="51" name="Picture 2"/>
+              <p:cNvPicPr>
+                <a:picLocks noChangeAspect="1" noChangeArrowheads="1"/>
+              </p:cNvPicPr>
+              <p:nvPr/>
+            </p:nvPicPr>
+            <p:blipFill>
+              <a:blip r:embed="rId5">
+                <a:extLst>
+                  <a:ext uri="{28A0092B-C50C-407E-A947-70E740481C1C}">
+                    <a14:useLocalDpi xmlns:a14="http://schemas.microsoft.com/office/drawing/2010/main" val="0"/>
+                  </a:ext>
+                </a:extLst>
+              </a:blip>
+              <a:srcRect/>
+              <a:stretch>
+                <a:fillRect/>
+              </a:stretch>
+            </p:blipFill>
+            <p:spPr bwMode="auto">
+              <a:xfrm>
+                <a:off x="3951469" y="4724400"/>
+                <a:ext cx="133350" cy="128588"/>
+              </a:xfrm>
+              <a:prstGeom prst="rect">
+                <a:avLst/>
+              </a:prstGeom>
+              <a:noFill/>
+              <a:ln>
+                <a:noFill/>
+              </a:ln>
+              <a:extLst>
+                <a:ext uri="{909E8E84-426E-40DD-AFC4-6F175D3DCCD1}">
+                  <a14:hiddenFill xmlns:a14="http://schemas.microsoft.com/office/drawing/2010/main">
+                    <a:solidFill>
+                      <a:schemeClr val="accent1"/>
+                    </a:solidFill>
+                  </a14:hiddenFill>
+                </a:ext>
+                <a:ext uri="{91240B29-F687-4F45-9708-019B960494DF}">
+                  <a14:hiddenLine xmlns:a14="http://schemas.microsoft.com/office/drawing/2010/main" w="9525">
+                    <a:solidFill>
+                      <a:schemeClr val="tx1"/>
+                    </a:solidFill>
+                    <a:miter lim="800000"/>
+                    <a:headEnd/>
+                    <a:tailEnd/>
+                  </a14:hiddenLine>
+                </a:ext>
+              </a:extLst>
+            </p:spPr>
+          </p:pic>
+          <p:pic>
+            <p:nvPicPr>
+              <p:cNvPr id="52" name="Picture 2"/>
+              <p:cNvPicPr>
+                <a:picLocks noChangeAspect="1" noChangeArrowheads="1"/>
+              </p:cNvPicPr>
+              <p:nvPr/>
+            </p:nvPicPr>
+            <p:blipFill>
+              <a:blip r:embed="rId5">
+                <a:extLst>
+                  <a:ext uri="{28A0092B-C50C-407E-A947-70E740481C1C}">
+                    <a14:useLocalDpi xmlns:a14="http://schemas.microsoft.com/office/drawing/2010/main" val="0"/>
+                  </a:ext>
+                </a:extLst>
+              </a:blip>
+              <a:srcRect/>
+              <a:stretch>
+                <a:fillRect/>
+              </a:stretch>
+            </p:blipFill>
+            <p:spPr bwMode="auto">
+              <a:xfrm>
+                <a:off x="3951469" y="5029200"/>
+                <a:ext cx="133350" cy="128588"/>
+              </a:xfrm>
+              <a:prstGeom prst="rect">
+                <a:avLst/>
+              </a:prstGeom>
+              <a:noFill/>
+              <a:ln>
+                <a:noFill/>
+              </a:ln>
+              <a:extLst>
+                <a:ext uri="{909E8E84-426E-40DD-AFC4-6F175D3DCCD1}">
+                  <a14:hiddenFill xmlns:a14="http://schemas.microsoft.com/office/drawing/2010/main">
+                    <a:solidFill>
+                      <a:schemeClr val="accent1"/>
+                    </a:solidFill>
+                  </a14:hiddenFill>
+                </a:ext>
+                <a:ext uri="{91240B29-F687-4F45-9708-019B960494DF}">
+                  <a14:hiddenLine xmlns:a14="http://schemas.microsoft.com/office/drawing/2010/main" w="9525">
+                    <a:solidFill>
+                      <a:schemeClr val="tx1"/>
+                    </a:solidFill>
+                    <a:miter lim="800000"/>
+                    <a:headEnd/>
+                    <a:tailEnd/>
+                  </a14:hiddenLine>
+                </a:ext>
+              </a:extLst>
+            </p:spPr>
+          </p:pic>
+          <p:pic>
+            <p:nvPicPr>
+              <p:cNvPr id="53" name="Picture 2"/>
+              <p:cNvPicPr>
+                <a:picLocks noChangeAspect="1" noChangeArrowheads="1"/>
+              </p:cNvPicPr>
+              <p:nvPr/>
+            </p:nvPicPr>
+            <p:blipFill>
+              <a:blip r:embed="rId5">
+                <a:extLst>
+                  <a:ext uri="{28A0092B-C50C-407E-A947-70E740481C1C}">
+                    <a14:useLocalDpi xmlns:a14="http://schemas.microsoft.com/office/drawing/2010/main" val="0"/>
+                  </a:ext>
+                </a:extLst>
+              </a:blip>
+              <a:srcRect/>
+              <a:stretch>
+                <a:fillRect/>
+              </a:stretch>
+            </p:blipFill>
+            <p:spPr bwMode="auto">
+              <a:xfrm>
+                <a:off x="3951469" y="5334000"/>
+                <a:ext cx="133350" cy="128588"/>
+              </a:xfrm>
+              <a:prstGeom prst="rect">
+                <a:avLst/>
+              </a:prstGeom>
+              <a:noFill/>
+              <a:ln>
+                <a:noFill/>
+              </a:ln>
+              <a:extLst>
+                <a:ext uri="{909E8E84-426E-40DD-AFC4-6F175D3DCCD1}">
+                  <a14:hiddenFill xmlns:a14="http://schemas.microsoft.com/office/drawing/2010/main">
+                    <a:solidFill>
+                      <a:schemeClr val="accent1"/>
+                    </a:solidFill>
+                  </a14:hiddenFill>
+                </a:ext>
+                <a:ext uri="{91240B29-F687-4F45-9708-019B960494DF}">
+                  <a14:hiddenLine xmlns:a14="http://schemas.microsoft.com/office/drawing/2010/main" w="9525">
+                    <a:solidFill>
+                      <a:schemeClr val="tx1"/>
+                    </a:solidFill>
+                    <a:miter lim="800000"/>
+                    <a:headEnd/>
+                    <a:tailEnd/>
+                  </a14:hiddenLine>
+                </a:ext>
+              </a:extLst>
+            </p:spPr>
+          </p:pic>
+          <p:pic>
+            <p:nvPicPr>
+              <p:cNvPr id="54" name="Picture 2"/>
+              <p:cNvPicPr>
+                <a:picLocks noChangeAspect="1" noChangeArrowheads="1"/>
+              </p:cNvPicPr>
+              <p:nvPr/>
+            </p:nvPicPr>
+            <p:blipFill>
+              <a:blip r:embed="rId5">
+                <a:extLst>
+                  <a:ext uri="{28A0092B-C50C-407E-A947-70E740481C1C}">
+                    <a14:useLocalDpi xmlns:a14="http://schemas.microsoft.com/office/drawing/2010/main" val="0"/>
+                  </a:ext>
+                </a:extLst>
+              </a:blip>
+              <a:srcRect/>
+              <a:stretch>
+                <a:fillRect/>
+              </a:stretch>
+            </p:blipFill>
+            <p:spPr bwMode="auto">
+              <a:xfrm>
+                <a:off x="3951469" y="5638800"/>
+                <a:ext cx="133350" cy="128588"/>
+              </a:xfrm>
+              <a:prstGeom prst="rect">
+                <a:avLst/>
+              </a:prstGeom>
+              <a:noFill/>
+              <a:ln>
+                <a:noFill/>
+              </a:ln>
+              <a:extLst>
+                <a:ext uri="{909E8E84-426E-40DD-AFC4-6F175D3DCCD1}">
+                  <a14:hiddenFill xmlns:a14="http://schemas.microsoft.com/office/drawing/2010/main">
+                    <a:solidFill>
+                      <a:schemeClr val="accent1"/>
+                    </a:solidFill>
+                  </a14:hiddenFill>
+                </a:ext>
+                <a:ext uri="{91240B29-F687-4F45-9708-019B960494DF}">
+                  <a14:hiddenLine xmlns:a14="http://schemas.microsoft.com/office/drawing/2010/main" w="9525">
+                    <a:solidFill>
+                      <a:schemeClr val="tx1"/>
+                    </a:solidFill>
+                    <a:miter lim="800000"/>
+                    <a:headEnd/>
+                    <a:tailEnd/>
+                  </a14:hiddenLine>
+                </a:ext>
+              </a:extLst>
+            </p:spPr>
+          </p:pic>
+        </p:grpSp>
+        <p:grpSp>
+          <p:nvGrpSpPr>
+            <p:cNvPr id="55" name="Group 54"/>
+            <p:cNvGrpSpPr/>
+            <p:nvPr/>
+          </p:nvGrpSpPr>
+          <p:grpSpPr>
+            <a:xfrm>
+              <a:off x="6845768" y="3716652"/>
+              <a:ext cx="133350" cy="1347788"/>
+              <a:chOff x="3951469" y="4419600"/>
+              <a:chExt cx="133350" cy="1347788"/>
+            </a:xfrm>
+          </p:grpSpPr>
+          <p:pic>
+            <p:nvPicPr>
+              <p:cNvPr id="56" name="Picture 2"/>
+              <p:cNvPicPr>
+                <a:picLocks noChangeAspect="1" noChangeArrowheads="1"/>
+              </p:cNvPicPr>
+              <p:nvPr/>
+            </p:nvPicPr>
+            <p:blipFill>
+              <a:blip r:embed="rId5">
+                <a:extLst>
+                  <a:ext uri="{28A0092B-C50C-407E-A947-70E740481C1C}">
+                    <a14:useLocalDpi xmlns:a14="http://schemas.microsoft.com/office/drawing/2010/main" val="0"/>
+                  </a:ext>
+                </a:extLst>
+              </a:blip>
+              <a:srcRect/>
+              <a:stretch>
+                <a:fillRect/>
+              </a:stretch>
+            </p:blipFill>
+            <p:spPr bwMode="auto">
+              <a:xfrm>
+                <a:off x="3951469" y="4419600"/>
+                <a:ext cx="133350" cy="128588"/>
+              </a:xfrm>
+              <a:prstGeom prst="rect">
+                <a:avLst/>
+              </a:prstGeom>
+              <a:noFill/>
+              <a:ln>
+                <a:noFill/>
+              </a:ln>
+              <a:extLst>
+                <a:ext uri="{909E8E84-426E-40DD-AFC4-6F175D3DCCD1}">
+                  <a14:hiddenFill xmlns:a14="http://schemas.microsoft.com/office/drawing/2010/main">
+                    <a:solidFill>
+                      <a:schemeClr val="accent1"/>
+                    </a:solidFill>
+                  </a14:hiddenFill>
+                </a:ext>
+                <a:ext uri="{91240B29-F687-4F45-9708-019B960494DF}">
+                  <a14:hiddenLine xmlns:a14="http://schemas.microsoft.com/office/drawing/2010/main" w="9525">
+                    <a:solidFill>
+                      <a:schemeClr val="tx1"/>
+                    </a:solidFill>
+                    <a:miter lim="800000"/>
+                    <a:headEnd/>
+                    <a:tailEnd/>
+                  </a14:hiddenLine>
+                </a:ext>
+              </a:extLst>
+            </p:spPr>
+          </p:pic>
+          <p:pic>
+            <p:nvPicPr>
+              <p:cNvPr id="57" name="Picture 2"/>
+              <p:cNvPicPr>
+                <a:picLocks noChangeAspect="1" noChangeArrowheads="1"/>
+              </p:cNvPicPr>
+              <p:nvPr/>
+            </p:nvPicPr>
+            <p:blipFill>
+              <a:blip r:embed="rId5">
+                <a:extLst>
+                  <a:ext uri="{28A0092B-C50C-407E-A947-70E740481C1C}">
+                    <a14:useLocalDpi xmlns:a14="http://schemas.microsoft.com/office/drawing/2010/main" val="0"/>
+                  </a:ext>
+                </a:extLst>
+              </a:blip>
+              <a:srcRect/>
+              <a:stretch>
+                <a:fillRect/>
+              </a:stretch>
+            </p:blipFill>
+            <p:spPr bwMode="auto">
+              <a:xfrm>
+                <a:off x="3951469" y="4724400"/>
+                <a:ext cx="133350" cy="128588"/>
+              </a:xfrm>
+              <a:prstGeom prst="rect">
+                <a:avLst/>
+              </a:prstGeom>
+              <a:noFill/>
+              <a:ln>
+                <a:noFill/>
+              </a:ln>
+              <a:extLst>
+                <a:ext uri="{909E8E84-426E-40DD-AFC4-6F175D3DCCD1}">
+                  <a14:hiddenFill xmlns:a14="http://schemas.microsoft.com/office/drawing/2010/main">
+                    <a:solidFill>
+                      <a:schemeClr val="accent1"/>
+                    </a:solidFill>
+                  </a14:hiddenFill>
+                </a:ext>
+                <a:ext uri="{91240B29-F687-4F45-9708-019B960494DF}">
+                  <a14:hiddenLine xmlns:a14="http://schemas.microsoft.com/office/drawing/2010/main" w="9525">
+                    <a:solidFill>
+                      <a:schemeClr val="tx1"/>
+                    </a:solidFill>
+                    <a:miter lim="800000"/>
+                    <a:headEnd/>
+                    <a:tailEnd/>
+                  </a14:hiddenLine>
+                </a:ext>
+              </a:extLst>
+            </p:spPr>
+          </p:pic>
+          <p:pic>
+            <p:nvPicPr>
+              <p:cNvPr id="58" name="Picture 2"/>
+              <p:cNvPicPr>
+                <a:picLocks noChangeAspect="1" noChangeArrowheads="1"/>
+              </p:cNvPicPr>
+              <p:nvPr/>
+            </p:nvPicPr>
+            <p:blipFill>
+              <a:blip r:embed="rId5">
+                <a:extLst>
+                  <a:ext uri="{28A0092B-C50C-407E-A947-70E740481C1C}">
+                    <a14:useLocalDpi xmlns:a14="http://schemas.microsoft.com/office/drawing/2010/main" val="0"/>
+                  </a:ext>
+                </a:extLst>
+              </a:blip>
+              <a:srcRect/>
+              <a:stretch>
+                <a:fillRect/>
+              </a:stretch>
+            </p:blipFill>
+            <p:spPr bwMode="auto">
+              <a:xfrm>
+                <a:off x="3951469" y="5029200"/>
+                <a:ext cx="133350" cy="128588"/>
+              </a:xfrm>
+              <a:prstGeom prst="rect">
+                <a:avLst/>
+              </a:prstGeom>
+              <a:noFill/>
+              <a:ln>
+                <a:noFill/>
+              </a:ln>
+              <a:extLst>
+                <a:ext uri="{909E8E84-426E-40DD-AFC4-6F175D3DCCD1}">
+                  <a14:hiddenFill xmlns:a14="http://schemas.microsoft.com/office/drawing/2010/main">
+                    <a:solidFill>
+                      <a:schemeClr val="accent1"/>
+                    </a:solidFill>
+                  </a14:hiddenFill>
+                </a:ext>
+                <a:ext uri="{91240B29-F687-4F45-9708-019B960494DF}">
+                  <a14:hiddenLine xmlns:a14="http://schemas.microsoft.com/office/drawing/2010/main" w="9525">
+                    <a:solidFill>
+                      <a:schemeClr val="tx1"/>
+                    </a:solidFill>
+                    <a:miter lim="800000"/>
+                    <a:headEnd/>
+                    <a:tailEnd/>
+                  </a14:hiddenLine>
+                </a:ext>
+              </a:extLst>
+            </p:spPr>
+          </p:pic>
+          <p:pic>
+            <p:nvPicPr>
+              <p:cNvPr id="59" name="Picture 2"/>
+              <p:cNvPicPr>
+                <a:picLocks noChangeAspect="1" noChangeArrowheads="1"/>
+              </p:cNvPicPr>
+              <p:nvPr/>
+            </p:nvPicPr>
+            <p:blipFill>
+              <a:blip r:embed="rId5">
+                <a:extLst>
+                  <a:ext uri="{28A0092B-C50C-407E-A947-70E740481C1C}">
+                    <a14:useLocalDpi xmlns:a14="http://schemas.microsoft.com/office/drawing/2010/main" val="0"/>
+                  </a:ext>
+                </a:extLst>
+              </a:blip>
+              <a:srcRect/>
+              <a:stretch>
+                <a:fillRect/>
+              </a:stretch>
+            </p:blipFill>
+            <p:spPr bwMode="auto">
+              <a:xfrm>
+                <a:off x="3951469" y="5334000"/>
+                <a:ext cx="133350" cy="128588"/>
+              </a:xfrm>
+              <a:prstGeom prst="rect">
+                <a:avLst/>
+              </a:prstGeom>
+              <a:noFill/>
+              <a:ln>
+                <a:noFill/>
+              </a:ln>
+              <a:extLst>
+                <a:ext uri="{909E8E84-426E-40DD-AFC4-6F175D3DCCD1}">
+                  <a14:hiddenFill xmlns:a14="http://schemas.microsoft.com/office/drawing/2010/main">
+                    <a:solidFill>
+                      <a:schemeClr val="accent1"/>
+                    </a:solidFill>
+                  </a14:hiddenFill>
+                </a:ext>
+                <a:ext uri="{91240B29-F687-4F45-9708-019B960494DF}">
+                  <a14:hiddenLine xmlns:a14="http://schemas.microsoft.com/office/drawing/2010/main" w="9525">
+                    <a:solidFill>
+                      <a:schemeClr val="tx1"/>
+                    </a:solidFill>
+                    <a:miter lim="800000"/>
+                    <a:headEnd/>
+                    <a:tailEnd/>
+                  </a14:hiddenLine>
+                </a:ext>
+              </a:extLst>
+            </p:spPr>
+          </p:pic>
+          <p:pic>
+            <p:nvPicPr>
+              <p:cNvPr id="60" name="Picture 2"/>
+              <p:cNvPicPr>
+                <a:picLocks noChangeAspect="1" noChangeArrowheads="1"/>
+              </p:cNvPicPr>
+              <p:nvPr/>
+            </p:nvPicPr>
+            <p:blipFill>
+              <a:blip r:embed="rId5">
+                <a:extLst>
+                  <a:ext uri="{28A0092B-C50C-407E-A947-70E740481C1C}">
+                    <a14:useLocalDpi xmlns:a14="http://schemas.microsoft.com/office/drawing/2010/main" val="0"/>
+                  </a:ext>
+                </a:extLst>
+              </a:blip>
+              <a:srcRect/>
+              <a:stretch>
+                <a:fillRect/>
+              </a:stretch>
+            </p:blipFill>
+            <p:spPr bwMode="auto">
+              <a:xfrm>
+                <a:off x="3951469" y="5638800"/>
+                <a:ext cx="133350" cy="128588"/>
+              </a:xfrm>
+              <a:prstGeom prst="rect">
+                <a:avLst/>
+              </a:prstGeom>
+              <a:noFill/>
+              <a:ln>
+                <a:noFill/>
+              </a:ln>
+              <a:extLst>
+                <a:ext uri="{909E8E84-426E-40DD-AFC4-6F175D3DCCD1}">
+                  <a14:hiddenFill xmlns:a14="http://schemas.microsoft.com/office/drawing/2010/main">
+                    <a:solidFill>
+                      <a:schemeClr val="accent1"/>
+                    </a:solidFill>
+                  </a14:hiddenFill>
+                </a:ext>
+                <a:ext uri="{91240B29-F687-4F45-9708-019B960494DF}">
+                  <a14:hiddenLine xmlns:a14="http://schemas.microsoft.com/office/drawing/2010/main" w="9525">
+                    <a:solidFill>
+                      <a:schemeClr val="tx1"/>
+                    </a:solidFill>
+                    <a:miter lim="800000"/>
+                    <a:headEnd/>
+                    <a:tailEnd/>
+                  </a14:hiddenLine>
+                </a:ext>
+              </a:extLst>
+            </p:spPr>
+          </p:pic>
+        </p:grpSp>
+        <p:sp>
+          <p:nvSpPr>
+            <p:cNvPr id="61" name="Freeform 60"/>
+            <p:cNvSpPr/>
+            <p:nvPr/>
+          </p:nvSpPr>
+          <p:spPr>
+            <a:xfrm>
+              <a:off x="3934447" y="3724158"/>
+              <a:ext cx="87784" cy="85007"/>
+            </a:xfrm>
+            <a:custGeom>
+              <a:avLst/>
+              <a:gdLst>
+                <a:gd name="connsiteX0" fmla="*/ 0 w 1366982"/>
+                <a:gd name="connsiteY0" fmla="*/ 471055 h 895927"/>
+                <a:gd name="connsiteX1" fmla="*/ 267854 w 1366982"/>
+                <a:gd name="connsiteY1" fmla="*/ 895927 h 895927"/>
+                <a:gd name="connsiteX2" fmla="*/ 1366982 w 1366982"/>
+                <a:gd name="connsiteY2" fmla="*/ 0 h 895927"/>
+              </a:gdLst>
+              <a:ahLst/>
+              <a:cxnLst>
+                <a:cxn ang="0">
+                  <a:pos x="connsiteX0" y="connsiteY0"/>
+                </a:cxn>
+                <a:cxn ang="0">
+                  <a:pos x="connsiteX1" y="connsiteY1"/>
+                </a:cxn>
+                <a:cxn ang="0">
+                  <a:pos x="connsiteX2" y="connsiteY2"/>
+                </a:cxn>
+              </a:cxnLst>
+              <a:rect l="l" t="t" r="r" b="b"/>
+              <a:pathLst>
+                <a:path w="1366982" h="895927">
+                  <a:moveTo>
+                    <a:pt x="0" y="471055"/>
+                  </a:moveTo>
+                  <a:lnTo>
+                    <a:pt x="267854" y="895927"/>
+                  </a:lnTo>
+                  <a:lnTo>
+                    <a:pt x="1366982" y="0"/>
+                  </a:lnTo>
+                </a:path>
+              </a:pathLst>
+            </a:custGeom>
+            <a:noFill/>
+            <a:ln cap="rnd">
+              <a:solidFill>
+                <a:srgbClr val="0070C0"/>
+              </a:solidFill>
+            </a:ln>
+          </p:spPr>
+          <p:style>
+            <a:lnRef idx="2">
+              <a:schemeClr val="accent1">
+                <a:shade val="50000"/>
+              </a:schemeClr>
+            </a:lnRef>
+            <a:fillRef idx="1">
+              <a:schemeClr val="accent1"/>
+            </a:fillRef>
+            <a:effectRef idx="0">
+              <a:schemeClr val="accent1"/>
+            </a:effectRef>
+            <a:fontRef idx="minor">
+              <a:schemeClr val="lt1"/>
+            </a:fontRef>
+          </p:style>
+          <p:txBody>
+            <a:bodyPr rtlCol="0" anchor="ctr"/>
+            <a:lstStyle/>
+            <a:p>
+              <a:pPr algn="ctr"/>
+              <a:endParaRPr lang="en-SG"/>
+            </a:p>
+          </p:txBody>
+        </p:sp>
+        <p:sp>
+          <p:nvSpPr>
+            <p:cNvPr id="63" name="Freeform 62"/>
+            <p:cNvSpPr/>
+            <p:nvPr/>
+          </p:nvSpPr>
+          <p:spPr>
+            <a:xfrm>
+              <a:off x="6878265" y="4938011"/>
+              <a:ext cx="87784" cy="85007"/>
+            </a:xfrm>
+            <a:custGeom>
+              <a:avLst/>
+              <a:gdLst>
+                <a:gd name="connsiteX0" fmla="*/ 0 w 1366982"/>
+                <a:gd name="connsiteY0" fmla="*/ 471055 h 895927"/>
+                <a:gd name="connsiteX1" fmla="*/ 267854 w 1366982"/>
+                <a:gd name="connsiteY1" fmla="*/ 895927 h 895927"/>
+                <a:gd name="connsiteX2" fmla="*/ 1366982 w 1366982"/>
+                <a:gd name="connsiteY2" fmla="*/ 0 h 895927"/>
+              </a:gdLst>
+              <a:ahLst/>
+              <a:cxnLst>
+                <a:cxn ang="0">
+                  <a:pos x="connsiteX0" y="connsiteY0"/>
+                </a:cxn>
+                <a:cxn ang="0">
+                  <a:pos x="connsiteX1" y="connsiteY1"/>
+                </a:cxn>
+                <a:cxn ang="0">
+                  <a:pos x="connsiteX2" y="connsiteY2"/>
+                </a:cxn>
+              </a:cxnLst>
+              <a:rect l="l" t="t" r="r" b="b"/>
+              <a:pathLst>
+                <a:path w="1366982" h="895927">
+                  <a:moveTo>
+                    <a:pt x="0" y="471055"/>
+                  </a:moveTo>
+                  <a:lnTo>
+                    <a:pt x="267854" y="895927"/>
+                  </a:lnTo>
+                  <a:lnTo>
+                    <a:pt x="1366982" y="0"/>
+                  </a:lnTo>
+                </a:path>
+              </a:pathLst>
+            </a:custGeom>
+            <a:noFill/>
+            <a:ln cap="rnd">
+              <a:solidFill>
+                <a:srgbClr val="0070C0"/>
+              </a:solidFill>
+            </a:ln>
+          </p:spPr>
+          <p:style>
+            <a:lnRef idx="2">
+              <a:schemeClr val="accent1">
+                <a:shade val="50000"/>
+              </a:schemeClr>
+            </a:lnRef>
+            <a:fillRef idx="1">
+              <a:schemeClr val="accent1"/>
+            </a:fillRef>
+            <a:effectRef idx="0">
+              <a:schemeClr val="accent1"/>
+            </a:effectRef>
+            <a:fontRef idx="minor">
+              <a:schemeClr val="lt1"/>
+            </a:fontRef>
+          </p:style>
+          <p:txBody>
+            <a:bodyPr rtlCol="0" anchor="ctr"/>
+            <a:lstStyle/>
+            <a:p>
+              <a:pPr algn="ctr"/>
+              <a:endParaRPr lang="en-SG"/>
+            </a:p>
+          </p:txBody>
+        </p:sp>
+        <p:sp>
+          <p:nvSpPr>
+            <p:cNvPr id="64" name="Freeform 63"/>
+            <p:cNvSpPr/>
+            <p:nvPr/>
+          </p:nvSpPr>
+          <p:spPr>
+            <a:xfrm>
+              <a:off x="3927249" y="4938011"/>
+              <a:ext cx="87784" cy="85007"/>
+            </a:xfrm>
+            <a:custGeom>
+              <a:avLst/>
+              <a:gdLst>
+                <a:gd name="connsiteX0" fmla="*/ 0 w 1366982"/>
+                <a:gd name="connsiteY0" fmla="*/ 471055 h 895927"/>
+                <a:gd name="connsiteX1" fmla="*/ 267854 w 1366982"/>
+                <a:gd name="connsiteY1" fmla="*/ 895927 h 895927"/>
+                <a:gd name="connsiteX2" fmla="*/ 1366982 w 1366982"/>
+                <a:gd name="connsiteY2" fmla="*/ 0 h 895927"/>
+              </a:gdLst>
+              <a:ahLst/>
+              <a:cxnLst>
+                <a:cxn ang="0">
+                  <a:pos x="connsiteX0" y="connsiteY0"/>
+                </a:cxn>
+                <a:cxn ang="0">
+                  <a:pos x="connsiteX1" y="connsiteY1"/>
+                </a:cxn>
+                <a:cxn ang="0">
+                  <a:pos x="connsiteX2" y="connsiteY2"/>
+                </a:cxn>
+              </a:cxnLst>
+              <a:rect l="l" t="t" r="r" b="b"/>
+              <a:pathLst>
+                <a:path w="1366982" h="895927">
+                  <a:moveTo>
+                    <a:pt x="0" y="471055"/>
+                  </a:moveTo>
+                  <a:lnTo>
+                    <a:pt x="267854" y="895927"/>
+                  </a:lnTo>
+                  <a:lnTo>
+                    <a:pt x="1366982" y="0"/>
+                  </a:lnTo>
+                </a:path>
+              </a:pathLst>
+            </a:custGeom>
+            <a:noFill/>
+            <a:ln cap="rnd">
+              <a:solidFill>
+                <a:srgbClr val="0070C0"/>
+              </a:solidFill>
+            </a:ln>
+          </p:spPr>
+          <p:style>
+            <a:lnRef idx="2">
+              <a:schemeClr val="accent1">
+                <a:shade val="50000"/>
+              </a:schemeClr>
+            </a:lnRef>
+            <a:fillRef idx="1">
+              <a:schemeClr val="accent1"/>
+            </a:fillRef>
+            <a:effectRef idx="0">
+              <a:schemeClr val="accent1"/>
+            </a:effectRef>
+            <a:fontRef idx="minor">
+              <a:schemeClr val="lt1"/>
+            </a:fontRef>
+          </p:style>
+          <p:txBody>
+            <a:bodyPr rtlCol="0" anchor="ctr"/>
+            <a:lstStyle/>
+            <a:p>
+              <a:pPr algn="ctr"/>
+              <a:endParaRPr lang="en-SG"/>
+            </a:p>
+          </p:txBody>
+        </p:sp>
+        <p:sp>
+          <p:nvSpPr>
+            <p:cNvPr id="68" name="Rectangle 67"/>
+            <p:cNvSpPr/>
+            <p:nvPr/>
+          </p:nvSpPr>
+          <p:spPr>
+            <a:xfrm>
+              <a:off x="1577950" y="2248204"/>
+              <a:ext cx="2233704" cy="228600"/>
+            </a:xfrm>
+            <a:prstGeom prst="rect">
+              <a:avLst/>
+            </a:prstGeom>
+            <a:solidFill>
+              <a:schemeClr val="bg1"/>
+            </a:solidFill>
+            <a:ln w="9525">
+              <a:solidFill>
+                <a:schemeClr val="bg1">
+                  <a:lumMod val="75000"/>
+                </a:schemeClr>
+              </a:solidFill>
+            </a:ln>
+          </p:spPr>
+          <p:style>
+            <a:lnRef idx="2">
+              <a:schemeClr val="accent1">
+                <a:shade val="50000"/>
+              </a:schemeClr>
+            </a:lnRef>
+            <a:fillRef idx="1">
+              <a:schemeClr val="accent1"/>
+            </a:fillRef>
+            <a:effectRef idx="0">
+              <a:schemeClr val="accent1"/>
+            </a:effectRef>
+            <a:fontRef idx="minor">
+              <a:schemeClr val="lt1"/>
+            </a:fontRef>
+          </p:style>
+          <p:txBody>
+            <a:bodyPr rtlCol="0" anchor="ctr"/>
+            <a:lstStyle/>
+            <a:p>
+              <a:pPr lvl="0"/>
+              <a:endParaRPr lang="en-SG" sz="1200" b="1" dirty="0">
+                <a:solidFill>
+                  <a:srgbClr val="0070C0"/>
+                </a:solidFill>
+                <a:latin typeface="Consolas" panose="020B0609020204030204" pitchFamily="49" charset="0"/>
+                <a:cs typeface="Consolas" panose="020B0609020204030204" pitchFamily="49" charset="0"/>
+              </a:endParaRPr>
+            </a:p>
+          </p:txBody>
+        </p:sp>
+        <p:sp>
+          <p:nvSpPr>
+            <p:cNvPr id="69" name="Rectangle 68"/>
+            <p:cNvSpPr/>
+            <p:nvPr/>
+          </p:nvSpPr>
+          <p:spPr>
+            <a:xfrm>
+              <a:off x="1580401" y="2520585"/>
+              <a:ext cx="2233704" cy="228600"/>
+            </a:xfrm>
+            <a:prstGeom prst="rect">
+              <a:avLst/>
+            </a:prstGeom>
+            <a:solidFill>
+              <a:schemeClr val="bg1"/>
+            </a:solidFill>
+            <a:ln w="9525">
+              <a:solidFill>
+                <a:schemeClr val="bg1">
+                  <a:lumMod val="75000"/>
+                </a:schemeClr>
+              </a:solidFill>
+            </a:ln>
+          </p:spPr>
+          <p:style>
+            <a:lnRef idx="2">
+              <a:schemeClr val="accent1">
+                <a:shade val="50000"/>
+              </a:schemeClr>
+            </a:lnRef>
+            <a:fillRef idx="1">
+              <a:schemeClr val="accent1"/>
+            </a:fillRef>
+            <a:effectRef idx="0">
+              <a:schemeClr val="accent1"/>
+            </a:effectRef>
+            <a:fontRef idx="minor">
+              <a:schemeClr val="lt1"/>
+            </a:fontRef>
+          </p:style>
+          <p:txBody>
+            <a:bodyPr rtlCol="0" anchor="ctr"/>
+            <a:lstStyle/>
+            <a:p>
+              <a:pPr lvl="0"/>
+              <a:endParaRPr lang="en-SG" sz="1200" b="1" dirty="0">
+                <a:solidFill>
+                  <a:srgbClr val="0070C0"/>
+                </a:solidFill>
+                <a:latin typeface="Consolas" panose="020B0609020204030204" pitchFamily="49" charset="0"/>
+                <a:cs typeface="Consolas" panose="020B0609020204030204" pitchFamily="49" charset="0"/>
+              </a:endParaRPr>
+            </a:p>
+          </p:txBody>
+        </p:sp>
+        <p:pic>
+          <p:nvPicPr>
+            <p:cNvPr id="1026" name="Picture 2"/>
+            <p:cNvPicPr>
+              <a:picLocks noChangeAspect="1" noChangeArrowheads="1"/>
+            </p:cNvPicPr>
+            <p:nvPr/>
+          </p:nvPicPr>
+          <p:blipFill>
+            <a:blip r:embed="rId6">
+              <a:extLst>
+                <a:ext uri="{28A0092B-C50C-407E-A947-70E740481C1C}">
+                  <a14:useLocalDpi xmlns:a14="http://schemas.microsoft.com/office/drawing/2010/main" val="0"/>
+                </a:ext>
+              </a:extLst>
+            </a:blip>
+            <a:srcRect/>
+            <a:stretch>
+              <a:fillRect/>
+            </a:stretch>
+          </p:blipFill>
+          <p:spPr bwMode="auto">
+            <a:xfrm>
+              <a:off x="1364157" y="2305354"/>
+              <a:ext cx="123825" cy="114300"/>
+            </a:xfrm>
+            <a:prstGeom prst="flowChartConnector">
+              <a:avLst/>
+            </a:prstGeom>
+            <a:noFill/>
+            <a:ln>
+              <a:noFill/>
+            </a:ln>
+            <a:extLst>
+              <a:ext uri="{909E8E84-426E-40DD-AFC4-6F175D3DCCD1}">
+                <a14:hiddenFill xmlns:a14="http://schemas.microsoft.com/office/drawing/2010/main">
+                  <a:solidFill>
+                    <a:schemeClr val="accent1"/>
+                  </a:solidFill>
+                </a14:hiddenFill>
+              </a:ext>
+              <a:ext uri="{91240B29-F687-4F45-9708-019B960494DF}">
+                <a14:hiddenLine xmlns:a14="http://schemas.microsoft.com/office/drawing/2010/main" w="9525">
+                  <a:solidFill>
+                    <a:schemeClr val="tx1"/>
+                  </a:solidFill>
+                  <a:miter lim="800000"/>
+                  <a:headEnd/>
+                  <a:tailEnd/>
+                </a14:hiddenLine>
+              </a:ext>
+            </a:extLst>
+          </p:spPr>
+        </p:pic>
+        <p:pic>
+          <p:nvPicPr>
+            <p:cNvPr id="70" name="Picture 2"/>
+            <p:cNvPicPr>
+              <a:picLocks noChangeAspect="1" noChangeArrowheads="1"/>
+            </p:cNvPicPr>
+            <p:nvPr/>
+          </p:nvPicPr>
+          <p:blipFill>
+            <a:blip r:embed="rId6">
+              <a:extLst>
+                <a:ext uri="{28A0092B-C50C-407E-A947-70E740481C1C}">
+                  <a14:useLocalDpi xmlns:a14="http://schemas.microsoft.com/office/drawing/2010/main" val="0"/>
+                </a:ext>
+              </a:extLst>
+            </a:blip>
+            <a:srcRect/>
+            <a:stretch>
+              <a:fillRect/>
+            </a:stretch>
+          </p:blipFill>
+          <p:spPr bwMode="auto">
+            <a:xfrm>
+              <a:off x="1364157" y="2563303"/>
+              <a:ext cx="123825" cy="114300"/>
+            </a:xfrm>
+            <a:prstGeom prst="flowChartConnector">
+              <a:avLst/>
+            </a:prstGeom>
+            <a:noFill/>
+            <a:ln>
+              <a:noFill/>
+            </a:ln>
+            <a:extLst>
+              <a:ext uri="{909E8E84-426E-40DD-AFC4-6F175D3DCCD1}">
+                <a14:hiddenFill xmlns:a14="http://schemas.microsoft.com/office/drawing/2010/main">
+                  <a:solidFill>
+                    <a:schemeClr val="accent1"/>
+                  </a:solidFill>
+                </a14:hiddenFill>
+              </a:ext>
+              <a:ext uri="{91240B29-F687-4F45-9708-019B960494DF}">
+                <a14:hiddenLine xmlns:a14="http://schemas.microsoft.com/office/drawing/2010/main" w="9525">
+                  <a:solidFill>
+                    <a:schemeClr val="tx1"/>
+                  </a:solidFill>
+                  <a:miter lim="800000"/>
+                  <a:headEnd/>
+                  <a:tailEnd/>
+                </a14:hiddenLine>
+              </a:ext>
+            </a:extLst>
+          </p:spPr>
+        </p:pic>
+        <p:sp>
+          <p:nvSpPr>
+            <p:cNvPr id="2" name="TextBox 1"/>
+            <p:cNvSpPr txBox="1"/>
+            <p:nvPr/>
+          </p:nvSpPr>
+          <p:spPr>
+            <a:xfrm>
+              <a:off x="3896801" y="2199712"/>
+              <a:ext cx="141897" cy="246221"/>
+            </a:xfrm>
+            <a:prstGeom prst="rect">
+              <a:avLst/>
+            </a:prstGeom>
+            <a:noFill/>
+          </p:spPr>
+          <p:txBody>
+            <a:bodyPr wrap="square" lIns="0" tIns="0" rIns="0" bIns="0" rtlCol="0">
+              <a:spAutoFit/>
+            </a:bodyPr>
+            <a:lstStyle/>
+            <a:p>
+              <a:r>
+                <a:rPr lang="en-US" sz="1600" dirty="0" smtClean="0">
+                  <a:solidFill>
+                    <a:schemeClr val="bg1">
+                      <a:lumMod val="75000"/>
+                    </a:schemeClr>
+                  </a:solidFill>
+                </a:rPr>
+                <a:t>x</a:t>
+              </a:r>
+              <a:endParaRPr lang="en-SG" sz="1600" dirty="0">
+                <a:solidFill>
+                  <a:schemeClr val="bg1">
+                    <a:lumMod val="75000"/>
+                  </a:schemeClr>
+                </a:solidFill>
+              </a:endParaRPr>
+            </a:p>
+          </p:txBody>
+        </p:sp>
+        <p:sp>
+          <p:nvSpPr>
+            <p:cNvPr id="71" name="TextBox 70"/>
+            <p:cNvSpPr txBox="1"/>
+            <p:nvPr/>
+          </p:nvSpPr>
+          <p:spPr>
+            <a:xfrm>
+              <a:off x="3897229" y="2476804"/>
+              <a:ext cx="141897" cy="246221"/>
+            </a:xfrm>
+            <a:prstGeom prst="rect">
+              <a:avLst/>
+            </a:prstGeom>
+            <a:noFill/>
+          </p:spPr>
+          <p:txBody>
+            <a:bodyPr wrap="square" lIns="0" tIns="0" rIns="0" bIns="0" rtlCol="0">
+              <a:spAutoFit/>
+            </a:bodyPr>
+            <a:lstStyle/>
+            <a:p>
+              <a:r>
+                <a:rPr lang="en-US" sz="1600" dirty="0" smtClean="0">
+                  <a:solidFill>
+                    <a:schemeClr val="bg1">
+                      <a:lumMod val="75000"/>
+                    </a:schemeClr>
+                  </a:solidFill>
+                </a:rPr>
+                <a:t>x</a:t>
+              </a:r>
+              <a:endParaRPr lang="en-SG" sz="1600" dirty="0">
+                <a:solidFill>
+                  <a:schemeClr val="bg1">
+                    <a:lumMod val="75000"/>
+                  </a:schemeClr>
+                </a:solidFill>
+              </a:endParaRPr>
+            </a:p>
+          </p:txBody>
+        </p:sp>
+        <p:sp>
+          <p:nvSpPr>
+            <p:cNvPr id="72" name="TextBox 71"/>
+            <p:cNvSpPr txBox="1"/>
+            <p:nvPr/>
+          </p:nvSpPr>
+          <p:spPr>
+            <a:xfrm>
+              <a:off x="1591080" y="2733112"/>
+              <a:ext cx="1449477" cy="215444"/>
+            </a:xfrm>
+            <a:prstGeom prst="rect">
+              <a:avLst/>
+            </a:prstGeom>
+            <a:noFill/>
+          </p:spPr>
+          <p:txBody>
+            <a:bodyPr wrap="square" lIns="0" tIns="0" rIns="0" bIns="0" rtlCol="0">
+              <a:spAutoFit/>
+            </a:bodyPr>
+            <a:lstStyle/>
+            <a:p>
+              <a:r>
+                <a:rPr lang="en-US" sz="1400" dirty="0" smtClean="0">
+                  <a:solidFill>
+                    <a:schemeClr val="bg1">
+                      <a:lumMod val="75000"/>
+                    </a:schemeClr>
+                  </a:solidFill>
+                </a:rPr>
+                <a:t>+ </a:t>
+              </a:r>
+              <a:r>
+                <a:rPr lang="en-US" sz="1400" u="sng" dirty="0" smtClean="0">
+                  <a:solidFill>
+                    <a:schemeClr val="bg1">
+                      <a:lumMod val="75000"/>
+                    </a:schemeClr>
+                  </a:solidFill>
+                </a:rPr>
+                <a:t>add option</a:t>
+              </a:r>
+              <a:endParaRPr lang="en-SG" sz="1400" u="sng" dirty="0">
+                <a:solidFill>
+                  <a:schemeClr val="bg1">
+                    <a:lumMod val="75000"/>
+                  </a:schemeClr>
+                </a:solidFill>
+              </a:endParaRPr>
+            </a:p>
+          </p:txBody>
+        </p:sp>
+        <p:pic>
+          <p:nvPicPr>
+            <p:cNvPr id="62" name="Picture 2"/>
+            <p:cNvPicPr>
+              <a:picLocks noChangeAspect="1" noChangeArrowheads="1"/>
+            </p:cNvPicPr>
+            <p:nvPr/>
+          </p:nvPicPr>
+          <p:blipFill>
+            <a:blip r:embed="rId5">
+              <a:extLst>
+                <a:ext uri="{28A0092B-C50C-407E-A947-70E740481C1C}">
+                  <a14:useLocalDpi xmlns:a14="http://schemas.microsoft.com/office/drawing/2010/main" val="0"/>
+                </a:ext>
+              </a:extLst>
+            </a:blip>
+            <a:srcRect/>
+            <a:stretch>
+              <a:fillRect/>
+            </a:stretch>
+          </p:blipFill>
+          <p:spPr bwMode="auto">
+            <a:xfrm>
+              <a:off x="4592735" y="2291066"/>
+              <a:ext cx="133350" cy="128588"/>
+            </a:xfrm>
+            <a:prstGeom prst="rect">
+              <a:avLst/>
+            </a:prstGeom>
+            <a:noFill/>
+            <a:ln>
+              <a:noFill/>
+            </a:ln>
+            <a:extLst>
+              <a:ext uri="{909E8E84-426E-40DD-AFC4-6F175D3DCCD1}">
+                <a14:hiddenFill xmlns:a14="http://schemas.microsoft.com/office/drawing/2010/main">
+                  <a:solidFill>
+                    <a:schemeClr val="accent1"/>
+                  </a:solidFill>
+                </a14:hiddenFill>
+              </a:ext>
+              <a:ext uri="{91240B29-F687-4F45-9708-019B960494DF}">
+                <a14:hiddenLine xmlns:a14="http://schemas.microsoft.com/office/drawing/2010/main" w="9525">
+                  <a:solidFill>
+                    <a:schemeClr val="tx1"/>
+                  </a:solidFill>
+                  <a:miter lim="800000"/>
+                  <a:headEnd/>
+                  <a:tailEnd/>
+                </a14:hiddenLine>
+              </a:ext>
+            </a:extLst>
+          </p:spPr>
+        </p:pic>
+        <p:sp>
+          <p:nvSpPr>
+            <p:cNvPr id="65" name="TextBox 64"/>
+            <p:cNvSpPr txBox="1"/>
+            <p:nvPr/>
+          </p:nvSpPr>
+          <p:spPr>
+            <a:xfrm>
+              <a:off x="4690934" y="2239393"/>
+              <a:ext cx="2395666" cy="246221"/>
+            </a:xfrm>
+            <a:prstGeom prst="rect">
+              <a:avLst/>
+            </a:prstGeom>
+            <a:noFill/>
+          </p:spPr>
+          <p:txBody>
+            <a:bodyPr wrap="square" rtlCol="0">
+              <a:spAutoFit/>
+            </a:bodyPr>
+            <a:lstStyle/>
+            <a:p>
+              <a:pPr algn="r"/>
+              <a:r>
+                <a:rPr lang="en-US" sz="1000" dirty="0" smtClean="0">
+                  <a:solidFill>
+                    <a:schemeClr val="tx1">
+                      <a:lumMod val="50000"/>
+                      <a:lumOff val="50000"/>
+                    </a:schemeClr>
+                  </a:solidFill>
+                  <a:latin typeface="Verdana" panose="020B0604030504040204" pitchFamily="34" charset="0"/>
+                  <a:ea typeface="Verdana" panose="020B0604030504040204" pitchFamily="34" charset="0"/>
+                  <a:cs typeface="Verdana" panose="020B0604030504040204" pitchFamily="34" charset="0"/>
+                </a:rPr>
+                <a:t>Generate options from the list of :</a:t>
+              </a:r>
+              <a:endParaRPr lang="en-SG" sz="1000" dirty="0">
+                <a:solidFill>
+                  <a:schemeClr val="tx1">
+                    <a:lumMod val="50000"/>
+                    <a:lumOff val="50000"/>
+                  </a:schemeClr>
+                </a:solidFill>
+                <a:latin typeface="Verdana" panose="020B0604030504040204" pitchFamily="34" charset="0"/>
+                <a:ea typeface="Verdana" panose="020B0604030504040204" pitchFamily="34" charset="0"/>
+                <a:cs typeface="Verdana" panose="020B0604030504040204" pitchFamily="34" charset="0"/>
+              </a:endParaRPr>
+            </a:p>
+          </p:txBody>
+        </p:sp>
+        <p:grpSp>
+          <p:nvGrpSpPr>
+            <p:cNvPr id="66" name="Group 65"/>
+            <p:cNvGrpSpPr/>
+            <p:nvPr/>
+          </p:nvGrpSpPr>
+          <p:grpSpPr>
+            <a:xfrm>
+              <a:off x="7086600" y="2260110"/>
+              <a:ext cx="828140" cy="190500"/>
+              <a:chOff x="6868060" y="1364451"/>
+              <a:chExt cx="828140" cy="190500"/>
+            </a:xfrm>
+          </p:grpSpPr>
+          <p:pic>
+            <p:nvPicPr>
+              <p:cNvPr id="67" name="Picture 66"/>
+              <p:cNvPicPr>
+                <a:picLocks noChangeAspect="1" noChangeArrowheads="1"/>
+              </p:cNvPicPr>
+              <p:nvPr/>
+            </p:nvPicPr>
+            <p:blipFill rotWithShape="1">
+              <a:blip r:embed="rId3">
+                <a:extLst>
+                  <a:ext uri="{28A0092B-C50C-407E-A947-70E740481C1C}">
+                    <a14:useLocalDpi xmlns:a14="http://schemas.microsoft.com/office/drawing/2010/main" val="0"/>
+                  </a:ext>
+                </a:extLst>
+              </a:blip>
+              <a:srcRect l="88315"/>
+              <a:stretch/>
+            </p:blipFill>
+            <p:spPr bwMode="auto">
+              <a:xfrm>
+                <a:off x="7530368" y="1364451"/>
+                <a:ext cx="165832" cy="190500"/>
+              </a:xfrm>
+              <a:prstGeom prst="rect">
+                <a:avLst/>
+              </a:prstGeom>
+              <a:noFill/>
+              <a:ln>
+                <a:noFill/>
+              </a:ln>
+              <a:extLst>
+                <a:ext uri="{909E8E84-426E-40DD-AFC4-6F175D3DCCD1}">
+                  <a14:hiddenFill xmlns:a14="http://schemas.microsoft.com/office/drawing/2010/main">
+                    <a:solidFill>
+                      <a:schemeClr val="accent1"/>
+                    </a:solidFill>
+                  </a14:hiddenFill>
+                </a:ext>
+                <a:ext uri="{91240B29-F687-4F45-9708-019B960494DF}">
+                  <a14:hiddenLine xmlns:a14="http://schemas.microsoft.com/office/drawing/2010/main" w="9525">
+                    <a:solidFill>
+                      <a:schemeClr val="tx1"/>
+                    </a:solidFill>
+                    <a:miter lim="800000"/>
+                    <a:headEnd/>
+                    <a:tailEnd/>
+                  </a14:hiddenLine>
+                </a:ext>
+              </a:extLst>
+            </p:spPr>
+          </p:pic>
+          <p:sp>
+            <p:nvSpPr>
+              <p:cNvPr id="73" name="Rectangle 72"/>
+              <p:cNvSpPr/>
+              <p:nvPr/>
+            </p:nvSpPr>
+            <p:spPr>
+              <a:xfrm>
+                <a:off x="6868060" y="1380829"/>
+                <a:ext cx="662307" cy="153918"/>
+              </a:xfrm>
+              <a:prstGeom prst="rect">
+                <a:avLst/>
+              </a:prstGeom>
+              <a:solidFill>
+                <a:schemeClr val="bg1"/>
+              </a:solidFill>
+              <a:ln w="9525">
+                <a:solidFill>
+                  <a:schemeClr val="bg1">
+                    <a:lumMod val="75000"/>
+                  </a:schemeClr>
+                </a:solidFill>
+              </a:ln>
+            </p:spPr>
+            <p:style>
+              <a:lnRef idx="2">
+                <a:schemeClr val="accent1">
+                  <a:shade val="50000"/>
+                </a:schemeClr>
+              </a:lnRef>
+              <a:fillRef idx="1">
+                <a:schemeClr val="accent1"/>
+              </a:fillRef>
+              <a:effectRef idx="0">
+                <a:schemeClr val="accent1"/>
+              </a:effectRef>
+              <a:fontRef idx="minor">
+                <a:schemeClr val="lt1"/>
+              </a:fontRef>
+            </p:style>
+            <p:txBody>
+              <a:bodyPr lIns="0" tIns="0" rIns="0" bIns="0" rtlCol="0" anchor="ctr"/>
+              <a:lstStyle/>
+              <a:p>
+                <a:r>
+                  <a:rPr lang="en-US" sz="1050" b="1" dirty="0" smtClean="0">
+                    <a:solidFill>
+                      <a:srgbClr val="0070C0"/>
+                    </a:solidFill>
+                  </a:rPr>
+                  <a:t> Students</a:t>
+                </a:r>
+                <a:endParaRPr lang="en-SG" sz="1050" b="1" dirty="0">
+                  <a:solidFill>
+                    <a:srgbClr val="0070C0"/>
+                  </a:solidFill>
+                </a:endParaRPr>
+              </a:p>
+            </p:txBody>
+          </p:sp>
+        </p:grpSp>
+        <p:sp>
+          <p:nvSpPr>
+            <p:cNvPr id="8" name="Oval 7"/>
+            <p:cNvSpPr/>
+            <p:nvPr/>
+          </p:nvSpPr>
+          <p:spPr>
+            <a:xfrm>
+              <a:off x="4343400" y="2133600"/>
+              <a:ext cx="3571340" cy="466314"/>
+            </a:xfrm>
+            <a:prstGeom prst="ellipse">
+              <a:avLst/>
+            </a:prstGeom>
+            <a:noFill/>
+            <a:ln>
+              <a:solidFill>
+                <a:srgbClr val="C00000"/>
+              </a:solidFill>
+            </a:ln>
+            <a:effectLst>
+              <a:outerShdw blurRad="63500" sx="102000" sy="102000" algn="ctr" rotWithShape="0">
+                <a:prstClr val="black">
+                  <a:alpha val="40000"/>
+                </a:prstClr>
+              </a:outerShdw>
+            </a:effectLst>
+          </p:spPr>
+          <p:style>
+            <a:lnRef idx="2">
+              <a:schemeClr val="accent1">
+                <a:shade val="50000"/>
+              </a:schemeClr>
+            </a:lnRef>
+            <a:fillRef idx="1">
+              <a:schemeClr val="accent1"/>
+            </a:fillRef>
+            <a:effectRef idx="0">
+              <a:schemeClr val="accent1"/>
+            </a:effectRef>
+            <a:fontRef idx="minor">
+              <a:schemeClr val="lt1"/>
+            </a:fontRef>
+          </p:style>
+          <p:txBody>
+            <a:bodyPr rtlCol="0" anchor="ctr"/>
+            <a:lstStyle/>
+            <a:p>
+              <a:pPr algn="ctr"/>
+              <a:endParaRPr lang="en-SG"/>
+            </a:p>
+          </p:txBody>
+        </p:sp>
+        <p:sp>
+          <p:nvSpPr>
+            <p:cNvPr id="74" name="Freeform 73"/>
+            <p:cNvSpPr/>
+            <p:nvPr/>
+          </p:nvSpPr>
+          <p:spPr>
+            <a:xfrm>
+              <a:off x="4647042" y="2305354"/>
+              <a:ext cx="87784" cy="85007"/>
+            </a:xfrm>
+            <a:custGeom>
+              <a:avLst/>
+              <a:gdLst>
+                <a:gd name="connsiteX0" fmla="*/ 0 w 1366982"/>
+                <a:gd name="connsiteY0" fmla="*/ 471055 h 895927"/>
+                <a:gd name="connsiteX1" fmla="*/ 267854 w 1366982"/>
+                <a:gd name="connsiteY1" fmla="*/ 895927 h 895927"/>
+                <a:gd name="connsiteX2" fmla="*/ 1366982 w 1366982"/>
+                <a:gd name="connsiteY2" fmla="*/ 0 h 895927"/>
+              </a:gdLst>
+              <a:ahLst/>
+              <a:cxnLst>
+                <a:cxn ang="0">
+                  <a:pos x="connsiteX0" y="connsiteY0"/>
+                </a:cxn>
+                <a:cxn ang="0">
+                  <a:pos x="connsiteX1" y="connsiteY1"/>
+                </a:cxn>
+                <a:cxn ang="0">
+                  <a:pos x="connsiteX2" y="connsiteY2"/>
+                </a:cxn>
+              </a:cxnLst>
+              <a:rect l="l" t="t" r="r" b="b"/>
+              <a:pathLst>
+                <a:path w="1366982" h="895927">
+                  <a:moveTo>
+                    <a:pt x="0" y="471055"/>
+                  </a:moveTo>
+                  <a:lnTo>
+                    <a:pt x="267854" y="895927"/>
+                  </a:lnTo>
+                  <a:lnTo>
+                    <a:pt x="1366982" y="0"/>
+                  </a:lnTo>
+                </a:path>
+              </a:pathLst>
+            </a:custGeom>
+            <a:noFill/>
+            <a:ln cap="rnd">
+              <a:solidFill>
+                <a:srgbClr val="0070C0"/>
+              </a:solidFill>
+            </a:ln>
+          </p:spPr>
+          <p:style>
+            <a:lnRef idx="2">
+              <a:schemeClr val="accent1">
+                <a:shade val="50000"/>
+              </a:schemeClr>
+            </a:lnRef>
+            <a:fillRef idx="1">
+              <a:schemeClr val="accent1"/>
+            </a:fillRef>
+            <a:effectRef idx="0">
+              <a:schemeClr val="accent1"/>
+            </a:effectRef>
+            <a:fontRef idx="minor">
+              <a:schemeClr val="lt1"/>
+            </a:fontRef>
+          </p:style>
+          <p:txBody>
+            <a:bodyPr rtlCol="0" anchor="ctr"/>
+            <a:lstStyle/>
+            <a:p>
+              <a:pPr algn="ctr"/>
+              <a:endParaRPr lang="en-SG"/>
+            </a:p>
+          </p:txBody>
+        </p:sp>
+      </p:grpSp>
+    </p:spTree>
+    <p:extLst>
+      <p:ext uri="{BB962C8B-B14F-4D97-AF65-F5344CB8AC3E}">
+        <p14:creationId xmlns:p14="http://schemas.microsoft.com/office/powerpoint/2010/main" val="149163801"/>
+      </p:ext>
+    </p:extLst>
+  </p:cSld>
+  <p:clrMapOvr>
+    <a:masterClrMapping/>
+  </p:clrMapOvr>
+  <p:timing>
+    <p:tnLst>
+      <p:par>
+        <p:cTn id="1" dur="indefinite" restart="never" nodeType="tmRoot"/>
+      </p:par>
+    </p:tnLst>
+  </p:timing>
+</p:sld>
+</file>
+
+<file path=ppt/slides/slide12.xml><?xml version="1.0" encoding="utf-8"?>
+<p:sld xmlns:a="http://schemas.openxmlformats.org/drawingml/2006/main" xmlns:r="http://schemas.openxmlformats.org/officeDocument/2006/relationships" xmlns:p="http://schemas.openxmlformats.org/presentationml/2006/main">
+  <p:cSld>
+    <p:spTree>
+      <p:nvGrpSpPr>
+        <p:cNvPr id="1" name=""/>
+        <p:cNvGrpSpPr/>
+        <p:nvPr/>
+      </p:nvGrpSpPr>
+      <p:grpSpPr>
+        <a:xfrm>
+          <a:off x="0" y="0"/>
+          <a:ext cx="0" cy="0"/>
+          <a:chOff x="0" y="0"/>
+          <a:chExt cx="0" cy="0"/>
+        </a:xfrm>
+      </p:grpSpPr>
       <p:graphicFrame>
         <p:nvGraphicFramePr>
           <p:cNvPr id="2" name="Table 1"/>
@@ -4633,7 +8474,7 @@
 </p:sld>
 </file>
 
-<file path=ppt/slides/slide11.xml><?xml version="1.0" encoding="utf-8"?>
+<file path=ppt/slides/slide13.xml><?xml version="1.0" encoding="utf-8"?>
 <p:sld xmlns:a="http://schemas.openxmlformats.org/drawingml/2006/main" xmlns:r="http://schemas.openxmlformats.org/officeDocument/2006/relationships" xmlns:p="http://schemas.openxmlformats.org/presentationml/2006/main">
   <p:cSld name="PPSlideStart201401082034118328">
     <p:spTree>
@@ -5212,11 +9053,7 @@
                       </a:r>
                       <a:r>
                         <a:rPr lang="en-US" sz="1100" b="1" baseline="0" dirty="0" smtClean="0"/>
-                        <a:t>Team </a:t>
-                      </a:r>
-                      <a:r>
-                        <a:rPr lang="en-US" sz="1100" b="1" baseline="0" dirty="0" smtClean="0"/>
-                        <a:t>3</a:t>
+                        <a:t>Team 3</a:t>
                       </a:r>
                       <a:endParaRPr lang="en-SG" sz="1100" b="1" dirty="0"/>
                     </a:p>
@@ -5279,7 +9116,7 @@
 </p:sld>
 </file>
 
-<file path=ppt/slides/slide12.xml><?xml version="1.0" encoding="utf-8"?>
+<file path=ppt/slides/slide14.xml><?xml version="1.0" encoding="utf-8"?>
 <p:sld xmlns:a="http://schemas.openxmlformats.org/drawingml/2006/main" xmlns:r="http://schemas.openxmlformats.org/officeDocument/2006/relationships" xmlns:p="http://schemas.openxmlformats.org/presentationml/2006/main">
   <p:cSld>
     <p:spTree>
@@ -11349,15 +15186,7 @@
                             <a:schemeClr val="tx1"/>
                           </a:solidFill>
                         </a:rPr>
-                        <a:t>Equal </a:t>
-                      </a:r>
-                      <a:r>
-                        <a:rPr lang="en-US" sz="1100" b="0" baseline="0" dirty="0" smtClean="0">
-                          <a:solidFill>
-                            <a:schemeClr val="tx1"/>
-                          </a:solidFill>
-                        </a:rPr>
-                        <a:t>share </a:t>
+                        <a:t>Equal share </a:t>
                       </a:r>
                       <a:r>
                         <a:rPr lang="en-US" sz="1100" b="1" baseline="0" dirty="0" smtClean="0">
@@ -11495,11 +15324,7 @@
                       </a:r>
                       <a:r>
                         <a:rPr lang="en-SG" sz="1100" dirty="0" smtClean="0"/>
-                        <a:t>Your </a:t>
-                      </a:r>
-                      <a:r>
-                        <a:rPr lang="en-SG" sz="1100" dirty="0" smtClean="0"/>
-                        <a:t>passion</a:t>
+                        <a:t>Your passion</a:t>
                       </a:r>
                       <a:r>
                         <a:rPr lang="en-SG" sz="1100" baseline="0" dirty="0" smtClean="0"/>
@@ -11520,39 +15345,11 @@
                             </a:schemeClr>
                           </a:solidFill>
                         </a:rPr>
-                        <a:t>&lt;&lt;</a:t>
-                      </a:r>
-                      <a:r>
-                        <a:rPr lang="en-SG" sz="1100" dirty="0" smtClean="0">
-                          <a:solidFill>
-                            <a:schemeClr val="bg1">
-                              <a:lumMod val="50000"/>
-                            </a:schemeClr>
-                          </a:solidFill>
-                        </a:rPr>
-                        <a:t>Areas you can improve further</a:t>
-                      </a:r>
-                      <a:r>
-                        <a:rPr lang="en-SG" sz="1100" dirty="0" smtClean="0">
-                          <a:solidFill>
-                            <a:schemeClr val="bg1">
-                              <a:lumMod val="50000"/>
-                            </a:schemeClr>
-                          </a:solidFill>
-                        </a:rPr>
-                        <a:t>&gt;&gt; </a:t>
+                        <a:t>&lt;&lt;Areas you can improve further&gt;&gt; </a:t>
                       </a:r>
                       <a:r>
                         <a:rPr lang="en-SG" sz="1100" dirty="0" smtClean="0"/>
-                        <a:t>Take </a:t>
-                      </a:r>
-                      <a:r>
-                        <a:rPr lang="en-SG" sz="1100" dirty="0" smtClean="0"/>
-                        <a:t>it easy when others don’t agree with you </a:t>
-                      </a:r>
-                      <a:r>
-                        <a:rPr lang="en-SG" sz="1100" dirty="0" smtClean="0"/>
-                        <a:t>:-).</a:t>
+                        <a:t>Take it easy when others don’t agree with you :-).</a:t>
                       </a:r>
                       <a:r>
                         <a:rPr lang="en-SG" sz="1100" dirty="0" smtClean="0">
@@ -14631,10 +18428,6 @@
                 <a:rPr lang="en-SG" b="0" dirty="0" smtClean="0"/>
                 <a:t>Visibility of your responses:</a:t>
               </a:r>
-              <a:r>
-                <a:rPr lang="en-SG" b="0" dirty="0" smtClean="0"/>
-                <a:t/>
-              </a:r>
               <a:br>
                 <a:rPr lang="en-SG" b="0" dirty="0" smtClean="0"/>
               </a:br>
@@ -15262,17 +19055,7 @@
                   <a:latin typeface="Consolas" panose="020B0609020204030204" pitchFamily="49" charset="0"/>
                   <a:cs typeface="Consolas" panose="020B0609020204030204" pitchFamily="49" charset="0"/>
                 </a:rPr>
-                <a:t>Was this team member punctual</a:t>
-              </a:r>
-              <a:r>
-                <a:rPr lang="en-US" sz="1200" b="1" dirty="0" smtClean="0">
-                  <a:solidFill>
-                    <a:srgbClr val="0070C0"/>
-                  </a:solidFill>
-                  <a:latin typeface="Consolas" panose="020B0609020204030204" pitchFamily="49" charset="0"/>
-                  <a:cs typeface="Consolas" panose="020B0609020204030204" pitchFamily="49" charset="0"/>
-                </a:rPr>
-                <a:t>?</a:t>
+                <a:t>Was this team member punctual?</a:t>
               </a:r>
               <a:endParaRPr lang="en-SG" sz="1200" b="1" dirty="0">
                 <a:solidFill>
@@ -15469,23 +19252,7 @@
                       <a:srgbClr val="0070C0"/>
                     </a:solidFill>
                   </a:rPr>
-                  <a:t> </a:t>
-                </a:r>
-                <a:r>
-                  <a:rPr lang="en-US" sz="1050" b="1" dirty="0" smtClean="0">
-                    <a:solidFill>
-                      <a:srgbClr val="0070C0"/>
-                    </a:solidFill>
-                  </a:rPr>
-                  <a:t>Students </a:t>
-                </a:r>
-                <a:r>
-                  <a:rPr lang="en-US" sz="1050" b="1" dirty="0" smtClean="0">
-                    <a:solidFill>
-                      <a:srgbClr val="0070C0"/>
-                    </a:solidFill>
-                  </a:rPr>
-                  <a:t>in this course</a:t>
+                  <a:t> Students in this course</a:t>
                 </a:r>
                 <a:endParaRPr lang="en-SG" sz="1050" b="1" dirty="0">
                   <a:solidFill>
@@ -15664,15 +19431,7 @@
                       <a:srgbClr val="0070C0"/>
                     </a:solidFill>
                   </a:rPr>
-                  <a:t> </a:t>
-                </a:r>
-                <a:r>
-                  <a:rPr lang="en-US" sz="1050" b="1" dirty="0" smtClean="0">
-                    <a:solidFill>
-                      <a:srgbClr val="0070C0"/>
-                    </a:solidFill>
-                  </a:rPr>
-                  <a:t>Giver’s team members</a:t>
+                  <a:t> Giver’s team members</a:t>
                 </a:r>
                 <a:endParaRPr lang="en-SG" sz="1050" b="1" dirty="0">
                   <a:solidFill>

</xml_diff>